<commit_message>
Design 4-1 finished. But 4-1 is in progress.Sorry
</commit_message>
<xml_diff>
--- a/design/2016/models/4_design_model.pptx
+++ b/design/2016/models/4_design_model.pptx
@@ -110,7 +110,7 @@
   </p:defaultTextStyle>
   <p:extLst>
     <p:ext uri="{EFAFB233-063F-42B5-8137-9DF3F51BA10A}">
-      <p15:sldGuideLst xmlns:p15="http://schemas.microsoft.com/office/powerpoint/2012/main"/>
+      <p15:sldGuideLst xmlns:p15="http://schemas.microsoft.com/office/powerpoint/2012/main" xmlns=""/>
     </p:ext>
   </p:extLst>
 </p:presentation>
@@ -198,7 +198,7 @@
           <a:p>
             <a:fld id="{729140AA-5DCF-4644-846F-5EE03622738A}" type="datetimeFigureOut">
               <a:rPr kumimoji="1" lang="ja-JP" altLang="en-US" smtClean="0"/>
-              <a:t>2016/8/17</a:t>
+              <a:t>2016/8/18</a:t>
             </a:fld>
             <a:endParaRPr kumimoji="1" lang="ja-JP" altLang="en-US"/>
           </a:p>
@@ -629,7 +629,7 @@
           <a:p>
             <a:fld id="{D72B48E1-50D5-40B7-9AA4-D680720A3CD4}" type="datetimeFigureOut">
               <a:rPr kumimoji="1" lang="ja-JP" altLang="en-US" smtClean="0"/>
-              <a:t>2016/8/17</a:t>
+              <a:t>2016/8/18</a:t>
             </a:fld>
             <a:endParaRPr kumimoji="1" lang="ja-JP" altLang="en-US"/>
           </a:p>
@@ -831,7 +831,7 @@
           <a:p>
             <a:fld id="{D72B48E1-50D5-40B7-9AA4-D680720A3CD4}" type="datetimeFigureOut">
               <a:rPr kumimoji="1" lang="ja-JP" altLang="en-US" smtClean="0"/>
-              <a:t>2016/8/17</a:t>
+              <a:t>2016/8/18</a:t>
             </a:fld>
             <a:endParaRPr kumimoji="1" lang="ja-JP" altLang="en-US"/>
           </a:p>
@@ -1043,7 +1043,7 @@
           <a:p>
             <a:fld id="{D72B48E1-50D5-40B7-9AA4-D680720A3CD4}" type="datetimeFigureOut">
               <a:rPr kumimoji="1" lang="ja-JP" altLang="en-US" smtClean="0"/>
-              <a:t>2016/8/17</a:t>
+              <a:t>2016/8/18</a:t>
             </a:fld>
             <a:endParaRPr kumimoji="1" lang="ja-JP" altLang="en-US"/>
           </a:p>
@@ -1282,7 +1282,7 @@
           <a:p>
             <a:fld id="{D72B48E1-50D5-40B7-9AA4-D680720A3CD4}" type="datetimeFigureOut">
               <a:rPr kumimoji="1" lang="ja-JP" altLang="en-US" smtClean="0"/>
-              <a:t>2016/8/17</a:t>
+              <a:t>2016/8/18</a:t>
             </a:fld>
             <a:endParaRPr kumimoji="1" lang="ja-JP" altLang="en-US"/>
           </a:p>
@@ -1526,7 +1526,7 @@
           <a:p>
             <a:fld id="{D72B48E1-50D5-40B7-9AA4-D680720A3CD4}" type="datetimeFigureOut">
               <a:rPr kumimoji="1" lang="ja-JP" altLang="en-US" smtClean="0"/>
-              <a:t>2016/8/17</a:t>
+              <a:t>2016/8/18</a:t>
             </a:fld>
             <a:endParaRPr kumimoji="1" lang="ja-JP" altLang="en-US"/>
           </a:p>
@@ -1822,7 +1822,7 @@
           <a:p>
             <a:fld id="{D72B48E1-50D5-40B7-9AA4-D680720A3CD4}" type="datetimeFigureOut">
               <a:rPr kumimoji="1" lang="ja-JP" altLang="en-US" smtClean="0"/>
-              <a:t>2016/8/17</a:t>
+              <a:t>2016/8/18</a:t>
             </a:fld>
             <a:endParaRPr kumimoji="1" lang="ja-JP" altLang="en-US"/>
           </a:p>
@@ -2253,7 +2253,7 @@
           <a:p>
             <a:fld id="{D72B48E1-50D5-40B7-9AA4-D680720A3CD4}" type="datetimeFigureOut">
               <a:rPr kumimoji="1" lang="ja-JP" altLang="en-US" smtClean="0"/>
-              <a:t>2016/8/17</a:t>
+              <a:t>2016/8/18</a:t>
             </a:fld>
             <a:endParaRPr kumimoji="1" lang="ja-JP" altLang="en-US"/>
           </a:p>
@@ -2371,7 +2371,7 @@
           <a:p>
             <a:fld id="{D72B48E1-50D5-40B7-9AA4-D680720A3CD4}" type="datetimeFigureOut">
               <a:rPr kumimoji="1" lang="ja-JP" altLang="en-US" smtClean="0"/>
-              <a:t>2016/8/17</a:t>
+              <a:t>2016/8/18</a:t>
             </a:fld>
             <a:endParaRPr kumimoji="1" lang="ja-JP" altLang="en-US"/>
           </a:p>
@@ -2466,7 +2466,7 @@
           <a:p>
             <a:fld id="{D72B48E1-50D5-40B7-9AA4-D680720A3CD4}" type="datetimeFigureOut">
               <a:rPr kumimoji="1" lang="ja-JP" altLang="en-US" smtClean="0"/>
-              <a:t>2016/8/17</a:t>
+              <a:t>2016/8/18</a:t>
             </a:fld>
             <a:endParaRPr kumimoji="1" lang="ja-JP" altLang="en-US"/>
           </a:p>
@@ -2775,7 +2775,7 @@
           <a:p>
             <a:fld id="{D72B48E1-50D5-40B7-9AA4-D680720A3CD4}" type="datetimeFigureOut">
               <a:rPr kumimoji="1" lang="ja-JP" altLang="en-US" smtClean="0"/>
-              <a:t>2016/8/17</a:t>
+              <a:t>2016/8/18</a:t>
             </a:fld>
             <a:endParaRPr kumimoji="1" lang="ja-JP" altLang="en-US"/>
           </a:p>
@@ -3032,7 +3032,7 @@
           <a:p>
             <a:fld id="{D72B48E1-50D5-40B7-9AA4-D680720A3CD4}" type="datetimeFigureOut">
               <a:rPr kumimoji="1" lang="ja-JP" altLang="en-US" smtClean="0"/>
-              <a:t>2016/8/17</a:t>
+              <a:t>2016/8/18</a:t>
             </a:fld>
             <a:endParaRPr kumimoji="1" lang="ja-JP" altLang="en-US"/>
           </a:p>
@@ -3277,7 +3277,7 @@
           <a:p>
             <a:fld id="{D72B48E1-50D5-40B7-9AA4-D680720A3CD4}" type="datetimeFigureOut">
               <a:rPr kumimoji="1" lang="ja-JP" altLang="en-US" smtClean="0"/>
-              <a:t>2016/8/17</a:t>
+              <a:t>2016/8/18</a:t>
             </a:fld>
             <a:endParaRPr kumimoji="1" lang="ja-JP" altLang="en-US"/>
           </a:p>
@@ -4101,49 +4101,7 @@
                 <a:ea typeface="メイリオ" panose="020B0604030504040204" pitchFamily="50" charset="-128"/>
                 <a:cs typeface="メイリオ" panose="020B0604030504040204" pitchFamily="50" charset="-128"/>
               </a:rPr>
-              <a:t>(</a:t>
-            </a:r>
-            <a:r>
-              <a:rPr lang="ja-JP" altLang="en-US" sz="2000" dirty="0" smtClean="0">
-                <a:ln w="0"/>
-                <a:solidFill>
-                  <a:schemeClr val="bg1">
-                    <a:lumMod val="50000"/>
-                  </a:schemeClr>
-                </a:solidFill>
-                <a:effectLst>
-                  <a:outerShdw blurRad="38100" dist="38100" dir="2700000" algn="tl">
-                    <a:srgbClr val="000000">
-                      <a:alpha val="43137"/>
-                    </a:srgbClr>
-                  </a:outerShdw>
-                </a:effectLst>
-                <a:latin typeface="メイリオ" panose="020B0604030504040204" pitchFamily="50" charset="-128"/>
-                <a:ea typeface="メイリオ" panose="020B0604030504040204" pitchFamily="50" charset="-128"/>
-                <a:cs typeface="メイリオ" panose="020B0604030504040204" pitchFamily="50" charset="-128"/>
-              </a:rPr>
-              <a:t>振舞</a:t>
-            </a:r>
-            <a:r>
-              <a:rPr lang="en-US" altLang="ja-JP" sz="2000" dirty="0" smtClean="0">
-                <a:ln w="0"/>
-                <a:solidFill>
-                  <a:schemeClr val="bg1">
-                    <a:lumMod val="50000"/>
-                  </a:schemeClr>
-                </a:solidFill>
-                <a:effectLst>
-                  <a:outerShdw blurRad="38100" dist="38100" dir="2700000" algn="tl">
-                    <a:srgbClr val="000000">
-                      <a:alpha val="43137"/>
-                    </a:srgbClr>
-                  </a:outerShdw>
-                </a:effectLst>
-                <a:latin typeface="メイリオ" panose="020B0604030504040204" pitchFamily="50" charset="-128"/>
-                <a:ea typeface="メイリオ" panose="020B0604030504040204" pitchFamily="50" charset="-128"/>
-                <a:cs typeface="メイリオ" panose="020B0604030504040204" pitchFamily="50" charset="-128"/>
-              </a:rPr>
-              <a:t>)</a:t>
+              <a:t>(2)</a:t>
             </a:r>
             <a:endParaRPr lang="ja-JP" altLang="en-US" sz="2000" dirty="0">
               <a:ln w="0"/>
@@ -4410,31 +4368,7 @@
                 <a:ea typeface="メイリオ" panose="020B0604030504040204" pitchFamily="50" charset="-128"/>
                 <a:cs typeface="メイリオ" panose="020B0604030504040204" pitchFamily="50" charset="-128"/>
               </a:rPr>
-              <a:t>(</a:t>
-            </a:r>
-            <a:r>
-              <a:rPr lang="ja-JP" altLang="en-US" sz="2400" b="1" dirty="0">
-                <a:ln w="0"/>
-                <a:solidFill>
-                  <a:schemeClr val="bg1"/>
-                </a:solidFill>
-                <a:latin typeface="メイリオ" panose="020B0604030504040204" pitchFamily="50" charset="-128"/>
-                <a:ea typeface="メイリオ" panose="020B0604030504040204" pitchFamily="50" charset="-128"/>
-                <a:cs typeface="メイリオ" panose="020B0604030504040204" pitchFamily="50" charset="-128"/>
-              </a:rPr>
-              <a:t>構造</a:t>
-            </a:r>
-            <a:r>
-              <a:rPr lang="en-US" altLang="ja-JP" sz="2400" b="1" dirty="0" smtClean="0">
-                <a:ln w="0"/>
-                <a:solidFill>
-                  <a:schemeClr val="bg1"/>
-                </a:solidFill>
-                <a:latin typeface="メイリオ" panose="020B0604030504040204" pitchFamily="50" charset="-128"/>
-                <a:ea typeface="メイリオ" panose="020B0604030504040204" pitchFamily="50" charset="-128"/>
-                <a:cs typeface="メイリオ" panose="020B0604030504040204" pitchFamily="50" charset="-128"/>
-              </a:rPr>
-              <a:t>)</a:t>
+              <a:t>(1)</a:t>
             </a:r>
             <a:endParaRPr lang="ja-JP" altLang="en-US" sz="2400" b="1" dirty="0">
               <a:ln w="0"/>
@@ -4743,10 +4677,10 @@
         </p:nvGrpSpPr>
         <p:grpSpPr>
           <a:xfrm>
-            <a:off x="431686" y="3420186"/>
-            <a:ext cx="1236653" cy="331339"/>
-            <a:chOff x="525778" y="3622818"/>
-            <a:chExt cx="1236653" cy="331339"/>
+            <a:off x="431687" y="3420186"/>
+            <a:ext cx="1126770" cy="331339"/>
+            <a:chOff x="525779" y="3622818"/>
+            <a:chExt cx="1126770" cy="331339"/>
           </a:xfrm>
         </p:grpSpPr>
         <p:sp>
@@ -4757,8 +4691,8 @@
           </p:nvSpPr>
           <p:spPr>
             <a:xfrm>
-              <a:off x="525778" y="3718333"/>
-              <a:ext cx="1236653" cy="235824"/>
+              <a:off x="525779" y="3718333"/>
+              <a:ext cx="1126770" cy="235824"/>
             </a:xfrm>
             <a:prstGeom prst="rect">
               <a:avLst/>
@@ -5403,10 +5337,10 @@
         </p:nvGrpSpPr>
         <p:grpSpPr>
           <a:xfrm>
-            <a:off x="1713100" y="3419615"/>
-            <a:ext cx="1165860" cy="332452"/>
-            <a:chOff x="1807192" y="3622247"/>
-            <a:chExt cx="1165860" cy="332452"/>
+            <a:off x="1805832" y="3419615"/>
+            <a:ext cx="1073128" cy="332452"/>
+            <a:chOff x="1899924" y="3622247"/>
+            <a:chExt cx="1073128" cy="332452"/>
           </a:xfrm>
         </p:grpSpPr>
         <p:sp>
@@ -5417,8 +5351,8 @@
           </p:nvSpPr>
           <p:spPr>
             <a:xfrm>
-              <a:off x="1807192" y="3718754"/>
-              <a:ext cx="1165860" cy="235945"/>
+              <a:off x="1899924" y="3718754"/>
+              <a:ext cx="1073128" cy="235945"/>
             </a:xfrm>
             <a:prstGeom prst="rect">
               <a:avLst/>
@@ -5498,7 +5432,7 @@
           </p:nvSpPr>
           <p:spPr>
             <a:xfrm>
-              <a:off x="1807192" y="3622247"/>
+              <a:off x="1902604" y="3622247"/>
               <a:ext cx="278008" cy="96086"/>
             </a:xfrm>
             <a:prstGeom prst="rect">
@@ -5960,9 +5894,9 @@
           <p:nvPr/>
         </p:nvCxnSpPr>
         <p:spPr>
-          <a:xfrm>
+          <a:xfrm flipH="1">
             <a:off x="2296030" y="3752067"/>
-            <a:ext cx="0" cy="191272"/>
+            <a:ext cx="46366" cy="191272"/>
           </a:xfrm>
           <a:prstGeom prst="straightConnector1">
             <a:avLst/>
@@ -7301,8 +7235,8 @@
         </p:nvSpPr>
         <p:spPr>
           <a:xfrm>
-            <a:off x="369204" y="4647734"/>
-            <a:ext cx="7866227" cy="5734518"/>
+            <a:off x="361020" y="4647734"/>
+            <a:ext cx="8246627" cy="5847988"/>
           </a:xfrm>
           <a:prstGeom prst="rect">
             <a:avLst/>
@@ -7347,8 +7281,8 @@
         </p:nvSpPr>
         <p:spPr>
           <a:xfrm>
-            <a:off x="384875" y="4647734"/>
-            <a:ext cx="1871025" cy="307777"/>
+            <a:off x="361020" y="4647734"/>
+            <a:ext cx="4564070" cy="307777"/>
           </a:xfrm>
           <a:prstGeom prst="rect">
             <a:avLst/>
@@ -7383,7 +7317,51 @@
                 <a:ea typeface="メイリオ" panose="020B0604030504040204" pitchFamily="50" charset="-128"/>
                 <a:cs typeface="メイリオ" panose="020B0604030504040204" pitchFamily="50" charset="-128"/>
               </a:rPr>
-              <a:t>-1-2.</a:t>
+              <a:t>-1-3.</a:t>
+            </a:r>
+            <a:r>
+              <a:rPr lang="ja-JP" altLang="en-US" sz="1400" b="1" dirty="0" smtClean="0">
+                <a:solidFill>
+                  <a:schemeClr val="bg1"/>
+                </a:solidFill>
+                <a:latin typeface="メイリオ" panose="020B0604030504040204" pitchFamily="50" charset="-128"/>
+                <a:ea typeface="メイリオ" panose="020B0604030504040204" pitchFamily="50" charset="-128"/>
+                <a:cs typeface="メイリオ" panose="020B0604030504040204" pitchFamily="50" charset="-128"/>
+              </a:rPr>
+              <a:t> </a:t>
+            </a:r>
+            <a:r>
+              <a:rPr lang="en-US" altLang="ja-JP" sz="1400" b="1" dirty="0" smtClean="0">
+                <a:solidFill>
+                  <a:schemeClr val="bg1"/>
+                </a:solidFill>
+                <a:latin typeface="メイリオ" panose="020B0604030504040204" pitchFamily="50" charset="-128"/>
+                <a:ea typeface="メイリオ" panose="020B0604030504040204" pitchFamily="50" charset="-128"/>
+                <a:cs typeface="メイリオ" panose="020B0604030504040204" pitchFamily="50" charset="-128"/>
+              </a:rPr>
+              <a:t>R</a:t>
+            </a:r>
+            <a:r>
+              <a:rPr lang="ja-JP" altLang="en-US" sz="1400" b="1" dirty="0" smtClean="0">
+                <a:solidFill>
+                  <a:schemeClr val="bg1"/>
+                </a:solidFill>
+                <a:latin typeface="メイリオ" panose="020B0604030504040204" pitchFamily="50" charset="-128"/>
+                <a:ea typeface="メイリオ" panose="020B0604030504040204" pitchFamily="50" charset="-128"/>
+                <a:cs typeface="メイリオ" panose="020B0604030504040204" pitchFamily="50" charset="-128"/>
+              </a:rPr>
+              <a:t>ゲーム</a:t>
+            </a:r>
+            <a:r>
+              <a:rPr lang="ja-JP" altLang="en-US" sz="1400" b="1" dirty="0" smtClean="0">
+                <a:solidFill>
+                  <a:schemeClr val="bg1"/>
+                </a:solidFill>
+                <a:latin typeface="メイリオ" panose="020B0604030504040204" pitchFamily="50" charset="-128"/>
+                <a:ea typeface="メイリオ" panose="020B0604030504040204" pitchFamily="50" charset="-128"/>
+                <a:cs typeface="メイリオ" panose="020B0604030504040204" pitchFamily="50" charset="-128"/>
+              </a:rPr>
+              <a:t>攻略</a:t>
             </a:r>
             <a:r>
               <a:rPr lang="ja-JP" altLang="en-US" sz="1400" b="1" dirty="0">
@@ -7394,18 +7372,7 @@
                 <a:ea typeface="メイリオ" panose="020B0604030504040204" pitchFamily="50" charset="-128"/>
                 <a:cs typeface="メイリオ" panose="020B0604030504040204" pitchFamily="50" charset="-128"/>
               </a:rPr>
-              <a:t> </a:t>
-            </a:r>
-            <a:r>
-              <a:rPr lang="en-US" altLang="ja-JP" sz="1400" b="1" dirty="0" smtClean="0">
-                <a:solidFill>
-                  <a:schemeClr val="bg1"/>
-                </a:solidFill>
-                <a:latin typeface="メイリオ" panose="020B0604030504040204" pitchFamily="50" charset="-128"/>
-                <a:ea typeface="メイリオ" panose="020B0604030504040204" pitchFamily="50" charset="-128"/>
-                <a:cs typeface="メイリオ" panose="020B0604030504040204" pitchFamily="50" charset="-128"/>
-              </a:rPr>
-              <a:t>R</a:t>
+              <a:t>・</a:t>
             </a:r>
             <a:r>
               <a:rPr lang="ja-JP" altLang="en-US" sz="1400" b="1" dirty="0" smtClean="0">
@@ -7416,7 +7383,7 @@
                 <a:ea typeface="メイリオ" panose="020B0604030504040204" pitchFamily="50" charset="-128"/>
                 <a:cs typeface="メイリオ" panose="020B0604030504040204" pitchFamily="50" charset="-128"/>
               </a:rPr>
-              <a:t>ゲーム攻略</a:t>
+              <a:t>走行エリア攻略・攻略手順実行</a:t>
             </a:r>
             <a:endParaRPr kumimoji="1" lang="ja-JP" altLang="en-US" sz="1400" b="1" dirty="0">
               <a:solidFill>
@@ -7451,6 +7418,755 @@
           <a:prstGeom prst="rect">
             <a:avLst/>
           </a:prstGeom>
+        </p:spPr>
+      </p:pic>
+      <p:sp>
+        <p:nvSpPr>
+          <p:cNvPr id="55" name="テキスト ボックス 54"/>
+          <p:cNvSpPr txBox="1"/>
+          <p:nvPr/>
+        </p:nvSpPr>
+        <p:spPr>
+          <a:xfrm>
+            <a:off x="418439" y="4800820"/>
+            <a:ext cx="8149452" cy="600164"/>
+          </a:xfrm>
+          <a:prstGeom prst="rect">
+            <a:avLst/>
+          </a:prstGeom>
+          <a:noFill/>
+        </p:spPr>
+        <p:txBody>
+          <a:bodyPr wrap="square" rtlCol="0">
+            <a:spAutoFit/>
+          </a:bodyPr>
+          <a:lstStyle/>
+          <a:p>
+            <a:pPr indent="4664075"/>
+            <a:r>
+              <a:rPr lang="en-US" altLang="ja-JP" sz="1100" dirty="0" smtClean="0">
+                <a:solidFill>
+                  <a:srgbClr val="0000FF"/>
+                </a:solidFill>
+                <a:latin typeface="メイリオ" panose="020B0604030504040204" pitchFamily="50" charset="-128"/>
+                <a:ea typeface="メイリオ" panose="020B0604030504040204" pitchFamily="50" charset="-128"/>
+                <a:cs typeface="メイリオ" panose="020B0604030504040204" pitchFamily="50" charset="-128"/>
+              </a:rPr>
+              <a:t>R</a:t>
+            </a:r>
+            <a:r>
+              <a:rPr lang="ja-JP" altLang="en-US" sz="1100" dirty="0" smtClean="0">
+                <a:solidFill>
+                  <a:srgbClr val="0000FF"/>
+                </a:solidFill>
+                <a:latin typeface="メイリオ" panose="020B0604030504040204" pitchFamily="50" charset="-128"/>
+                <a:ea typeface="メイリオ" panose="020B0604030504040204" pitchFamily="50" charset="-128"/>
+                <a:cs typeface="メイリオ" panose="020B0604030504040204" pitchFamily="50" charset="-128"/>
+              </a:rPr>
+              <a:t>ゲーム攻略</a:t>
+            </a:r>
+            <a:r>
+              <a:rPr lang="ja-JP" altLang="en-US" sz="1100" dirty="0" smtClean="0">
+                <a:latin typeface="メイリオ" panose="020B0604030504040204" pitchFamily="50" charset="-128"/>
+                <a:ea typeface="メイリオ" panose="020B0604030504040204" pitchFamily="50" charset="-128"/>
+                <a:cs typeface="メイリオ" panose="020B0604030504040204" pitchFamily="50" charset="-128"/>
+              </a:rPr>
+              <a:t>および</a:t>
+            </a:r>
+            <a:r>
+              <a:rPr lang="ja-JP" altLang="en-US" sz="1100" dirty="0" smtClean="0">
+                <a:solidFill>
+                  <a:srgbClr val="0000FF"/>
+                </a:solidFill>
+                <a:latin typeface="メイリオ" panose="020B0604030504040204" pitchFamily="50" charset="-128"/>
+                <a:ea typeface="メイリオ" panose="020B0604030504040204" pitchFamily="50" charset="-128"/>
+                <a:cs typeface="メイリオ" panose="020B0604030504040204" pitchFamily="50" charset="-128"/>
+              </a:rPr>
+              <a:t>走行エリア攻略</a:t>
+            </a:r>
+            <a:r>
+              <a:rPr lang="ja-JP" altLang="en-US" sz="1100" dirty="0" smtClean="0">
+                <a:latin typeface="メイリオ" panose="020B0604030504040204" pitchFamily="50" charset="-128"/>
+                <a:ea typeface="メイリオ" panose="020B0604030504040204" pitchFamily="50" charset="-128"/>
+                <a:cs typeface="メイリオ" panose="020B0604030504040204" pitchFamily="50" charset="-128"/>
+              </a:rPr>
+              <a:t>は直接走行体を操作せず、攻略の手順を</a:t>
+            </a:r>
+            <a:r>
+              <a:rPr lang="ja-JP" altLang="en-US" sz="1100" dirty="0" smtClean="0">
+                <a:solidFill>
+                  <a:srgbClr val="0000FF"/>
+                </a:solidFill>
+                <a:latin typeface="メイリオ" panose="020B0604030504040204" pitchFamily="50" charset="-128"/>
+                <a:ea typeface="メイリオ" panose="020B0604030504040204" pitchFamily="50" charset="-128"/>
+                <a:cs typeface="メイリオ" panose="020B0604030504040204" pitchFamily="50" charset="-128"/>
+              </a:rPr>
+              <a:t>攻略手順実行</a:t>
+            </a:r>
+            <a:r>
+              <a:rPr lang="ja-JP" altLang="en-US" sz="1100" dirty="0" smtClean="0">
+                <a:latin typeface="メイリオ" panose="020B0604030504040204" pitchFamily="50" charset="-128"/>
+                <a:ea typeface="メイリオ" panose="020B0604030504040204" pitchFamily="50" charset="-128"/>
+                <a:cs typeface="メイリオ" panose="020B0604030504040204" pitchFamily="50" charset="-128"/>
+              </a:rPr>
+              <a:t>に登録する。攻略手順実行は登録された順に攻略手順を実行する。攻略手順実行の結果</a:t>
+            </a:r>
+            <a:r>
+              <a:rPr lang="en-US" altLang="ja-JP" sz="1100" dirty="0" smtClean="0">
+                <a:latin typeface="メイリオ" panose="020B0604030504040204" pitchFamily="50" charset="-128"/>
+                <a:ea typeface="メイリオ" panose="020B0604030504040204" pitchFamily="50" charset="-128"/>
+                <a:cs typeface="メイリオ" panose="020B0604030504040204" pitchFamily="50" charset="-128"/>
+              </a:rPr>
+              <a:t>(</a:t>
+            </a:r>
+            <a:r>
+              <a:rPr lang="ja-JP" altLang="en-US" sz="1100" dirty="0" smtClean="0">
+                <a:latin typeface="メイリオ" panose="020B0604030504040204" pitchFamily="50" charset="-128"/>
+                <a:ea typeface="メイリオ" panose="020B0604030504040204" pitchFamily="50" charset="-128"/>
+                <a:cs typeface="メイリオ" panose="020B0604030504040204" pitchFamily="50" charset="-128"/>
+              </a:rPr>
+              <a:t>ブロック</a:t>
+            </a:r>
+            <a:r>
+              <a:rPr lang="ja-JP" altLang="en-US" sz="1100" dirty="0">
+                <a:latin typeface="メイリオ" panose="020B0604030504040204" pitchFamily="50" charset="-128"/>
+                <a:ea typeface="メイリオ" panose="020B0604030504040204" pitchFamily="50" charset="-128"/>
+                <a:cs typeface="メイリオ" panose="020B0604030504040204" pitchFamily="50" charset="-128"/>
+              </a:rPr>
+              <a:t>の色</a:t>
+            </a:r>
+            <a:r>
+              <a:rPr lang="ja-JP" altLang="en-US" sz="1100" dirty="0" smtClean="0">
+                <a:latin typeface="メイリオ" panose="020B0604030504040204" pitchFamily="50" charset="-128"/>
+                <a:ea typeface="メイリオ" panose="020B0604030504040204" pitchFamily="50" charset="-128"/>
+                <a:cs typeface="メイリオ" panose="020B0604030504040204" pitchFamily="50" charset="-128"/>
+              </a:rPr>
+              <a:t>測定等</a:t>
+            </a:r>
+            <a:r>
+              <a:rPr lang="en-US" altLang="ja-JP" sz="1100" dirty="0" smtClean="0">
+                <a:latin typeface="メイリオ" panose="020B0604030504040204" pitchFamily="50" charset="-128"/>
+                <a:ea typeface="メイリオ" panose="020B0604030504040204" pitchFamily="50" charset="-128"/>
+                <a:cs typeface="メイリオ" panose="020B0604030504040204" pitchFamily="50" charset="-128"/>
+              </a:rPr>
+              <a:t>)</a:t>
+            </a:r>
+            <a:r>
+              <a:rPr lang="ja-JP" altLang="en-US" sz="1100" dirty="0" smtClean="0">
+                <a:latin typeface="メイリオ" panose="020B0604030504040204" pitchFamily="50" charset="-128"/>
+                <a:ea typeface="メイリオ" panose="020B0604030504040204" pitchFamily="50" charset="-128"/>
+                <a:cs typeface="メイリオ" panose="020B0604030504040204" pitchFamily="50" charset="-128"/>
+              </a:rPr>
+              <a:t>は、</a:t>
+            </a:r>
+            <a:r>
+              <a:rPr lang="en-US" altLang="ja-JP" sz="1100" dirty="0" smtClean="0">
+                <a:latin typeface="メイリオ" panose="020B0604030504040204" pitchFamily="50" charset="-128"/>
+                <a:ea typeface="メイリオ" panose="020B0604030504040204" pitchFamily="50" charset="-128"/>
+                <a:cs typeface="メイリオ" panose="020B0604030504040204" pitchFamily="50" charset="-128"/>
+              </a:rPr>
+              <a:t>R</a:t>
+            </a:r>
+            <a:r>
+              <a:rPr lang="ja-JP" altLang="en-US" sz="1100" dirty="0" smtClean="0">
+                <a:latin typeface="メイリオ" panose="020B0604030504040204" pitchFamily="50" charset="-128"/>
+                <a:ea typeface="メイリオ" panose="020B0604030504040204" pitchFamily="50" charset="-128"/>
+                <a:cs typeface="メイリオ" panose="020B0604030504040204" pitchFamily="50" charset="-128"/>
+              </a:rPr>
+              <a:t>ゲーム攻略の状態更新メンバ関数のデリゲートを介して反映される。</a:t>
+            </a:r>
+            <a:endParaRPr lang="en-US" altLang="ja-JP" sz="1100" dirty="0" smtClean="0">
+              <a:latin typeface="メイリオ" panose="020B0604030504040204" pitchFamily="50" charset="-128"/>
+              <a:ea typeface="メイリオ" panose="020B0604030504040204" pitchFamily="50" charset="-128"/>
+              <a:cs typeface="メイリオ" panose="020B0604030504040204" pitchFamily="50" charset="-128"/>
+            </a:endParaRPr>
+          </a:p>
+        </p:txBody>
+      </p:sp>
+      <p:sp>
+        <p:nvSpPr>
+          <p:cNvPr id="57" name="正方形/長方形 56"/>
+          <p:cNvSpPr/>
+          <p:nvPr/>
+        </p:nvSpPr>
+        <p:spPr>
+          <a:xfrm>
+            <a:off x="8713862" y="5261112"/>
+            <a:ext cx="6066665" cy="5234609"/>
+          </a:xfrm>
+          <a:prstGeom prst="rect">
+            <a:avLst/>
+          </a:prstGeom>
+          <a:noFill/>
+          <a:ln w="25400">
+            <a:solidFill>
+              <a:srgbClr val="D24726"/>
+            </a:solidFill>
+          </a:ln>
+        </p:spPr>
+        <p:style>
+          <a:lnRef idx="2">
+            <a:schemeClr val="accent1">
+              <a:shade val="50000"/>
+            </a:schemeClr>
+          </a:lnRef>
+          <a:fillRef idx="1">
+            <a:schemeClr val="accent1"/>
+          </a:fillRef>
+          <a:effectRef idx="0">
+            <a:schemeClr val="accent1"/>
+          </a:effectRef>
+          <a:fontRef idx="minor">
+            <a:schemeClr val="lt1"/>
+          </a:fontRef>
+        </p:style>
+        <p:txBody>
+          <a:bodyPr rtlCol="0" anchor="ctr"/>
+          <a:lstStyle/>
+          <a:p>
+            <a:pPr algn="ctr"/>
+            <a:endParaRPr kumimoji="1" lang="ja-JP" altLang="en-US"/>
+          </a:p>
+        </p:txBody>
+      </p:sp>
+      <p:sp>
+        <p:nvSpPr>
+          <p:cNvPr id="58" name="テキスト ボックス 57"/>
+          <p:cNvSpPr txBox="1"/>
+          <p:nvPr/>
+        </p:nvSpPr>
+        <p:spPr>
+          <a:xfrm>
+            <a:off x="8713862" y="5261112"/>
+            <a:ext cx="3943708" cy="307777"/>
+          </a:xfrm>
+          <a:prstGeom prst="rect">
+            <a:avLst/>
+          </a:prstGeom>
+          <a:solidFill>
+            <a:srgbClr val="D24726"/>
+          </a:solidFill>
+        </p:spPr>
+        <p:txBody>
+          <a:bodyPr wrap="none" rtlCol="0">
+            <a:spAutoFit/>
+          </a:bodyPr>
+          <a:lstStyle/>
+          <a:p>
+            <a:r>
+              <a:rPr lang="en-US" altLang="ja-JP" sz="1400" b="1" dirty="0" smtClean="0">
+                <a:solidFill>
+                  <a:schemeClr val="bg1"/>
+                </a:solidFill>
+                <a:latin typeface="メイリオ" panose="020B0604030504040204" pitchFamily="50" charset="-128"/>
+                <a:ea typeface="メイリオ" panose="020B0604030504040204" pitchFamily="50" charset="-128"/>
+                <a:cs typeface="メイリオ" panose="020B0604030504040204" pitchFamily="50" charset="-128"/>
+              </a:rPr>
+              <a:t>4</a:t>
+            </a:r>
+            <a:r>
+              <a:rPr kumimoji="1" lang="en-US" altLang="ja-JP" sz="1400" b="1" dirty="0" smtClean="0">
+                <a:solidFill>
+                  <a:schemeClr val="bg1"/>
+                </a:solidFill>
+                <a:latin typeface="メイリオ" panose="020B0604030504040204" pitchFamily="50" charset="-128"/>
+                <a:ea typeface="メイリオ" panose="020B0604030504040204" pitchFamily="50" charset="-128"/>
+                <a:cs typeface="メイリオ" panose="020B0604030504040204" pitchFamily="50" charset="-128"/>
+              </a:rPr>
+              <a:t>-1-4.</a:t>
+            </a:r>
+            <a:r>
+              <a:rPr lang="ja-JP" altLang="en-US" sz="1400" b="1" dirty="0" smtClean="0">
+                <a:solidFill>
+                  <a:schemeClr val="bg1"/>
+                </a:solidFill>
+                <a:latin typeface="メイリオ" panose="020B0604030504040204" pitchFamily="50" charset="-128"/>
+                <a:ea typeface="メイリオ" panose="020B0604030504040204" pitchFamily="50" charset="-128"/>
+                <a:cs typeface="メイリオ" panose="020B0604030504040204" pitchFamily="50" charset="-128"/>
+              </a:rPr>
+              <a:t> 動作</a:t>
+            </a:r>
+            <a:r>
+              <a:rPr lang="ja-JP" altLang="en-US" sz="1400" b="1" dirty="0">
+                <a:solidFill>
+                  <a:schemeClr val="bg1"/>
+                </a:solidFill>
+                <a:latin typeface="メイリオ" panose="020B0604030504040204" pitchFamily="50" charset="-128"/>
+                <a:ea typeface="メイリオ" panose="020B0604030504040204" pitchFamily="50" charset="-128"/>
+                <a:cs typeface="メイリオ" panose="020B0604030504040204" pitchFamily="50" charset="-128"/>
+              </a:rPr>
+              <a:t>・</a:t>
+            </a:r>
+            <a:r>
+              <a:rPr lang="ja-JP" altLang="en-US" sz="1400" b="1" dirty="0" smtClean="0">
+                <a:solidFill>
+                  <a:schemeClr val="bg1"/>
+                </a:solidFill>
+                <a:latin typeface="メイリオ" panose="020B0604030504040204" pitchFamily="50" charset="-128"/>
+                <a:ea typeface="メイリオ" panose="020B0604030504040204" pitchFamily="50" charset="-128"/>
+                <a:cs typeface="メイリオ" panose="020B0604030504040204" pitchFamily="50" charset="-128"/>
+              </a:rPr>
+              <a:t>センシング・デバイス制御・</a:t>
+            </a:r>
+            <a:r>
+              <a:rPr lang="en-US" altLang="ja-JP" sz="1400" b="1" dirty="0" smtClean="0">
+                <a:solidFill>
+                  <a:schemeClr val="bg1"/>
+                </a:solidFill>
+                <a:latin typeface="メイリオ" panose="020B0604030504040204" pitchFamily="50" charset="-128"/>
+                <a:ea typeface="メイリオ" panose="020B0604030504040204" pitchFamily="50" charset="-128"/>
+                <a:cs typeface="メイリオ" panose="020B0604030504040204" pitchFamily="50" charset="-128"/>
+              </a:rPr>
+              <a:t>UI</a:t>
+            </a:r>
+            <a:endParaRPr kumimoji="1" lang="ja-JP" altLang="en-US" sz="1400" b="1" dirty="0">
+              <a:solidFill>
+                <a:schemeClr val="bg1"/>
+              </a:solidFill>
+              <a:latin typeface="メイリオ" panose="020B0604030504040204" pitchFamily="50" charset="-128"/>
+              <a:ea typeface="メイリオ" panose="020B0604030504040204" pitchFamily="50" charset="-128"/>
+              <a:cs typeface="メイリオ" panose="020B0604030504040204" pitchFamily="50" charset="-128"/>
+            </a:endParaRPr>
+          </a:p>
+        </p:txBody>
+      </p:sp>
+      <p:pic>
+        <p:nvPicPr>
+          <p:cNvPr id="1029" name="Picture 5"/>
+          <p:cNvPicPr>
+            <a:picLocks noChangeAspect="1" noChangeArrowheads="1"/>
+          </p:cNvPicPr>
+          <p:nvPr/>
+        </p:nvPicPr>
+        <p:blipFill>
+          <a:blip r:embed="rId3" cstate="print">
+            <a:extLst>
+              <a:ext uri="{28A0092B-C50C-407E-A947-70E740481C1C}">
+                <a14:useLocalDpi xmlns:a14="http://schemas.microsoft.com/office/drawing/2010/main" val="0"/>
+              </a:ext>
+            </a:extLst>
+          </a:blip>
+          <a:srcRect/>
+          <a:stretch>
+            <a:fillRect/>
+          </a:stretch>
+        </p:blipFill>
+        <p:spPr bwMode="auto">
+          <a:xfrm>
+            <a:off x="8791370" y="6221050"/>
+            <a:ext cx="5893566" cy="4210799"/>
+          </a:xfrm>
+          <a:prstGeom prst="rect">
+            <a:avLst/>
+          </a:prstGeom>
+          <a:noFill/>
+          <a:ln>
+            <a:noFill/>
+          </a:ln>
+          <a:extLst>
+            <a:ext uri="{909E8E84-426E-40DD-AFC4-6F175D3DCCD1}">
+              <a14:hiddenFill xmlns:a14="http://schemas.microsoft.com/office/drawing/2010/main">
+                <a:solidFill>
+                  <a:schemeClr val="accent1"/>
+                </a:solidFill>
+              </a14:hiddenFill>
+            </a:ext>
+            <a:ext uri="{91240B29-F687-4F45-9708-019B960494DF}">
+              <a14:hiddenLine xmlns:a14="http://schemas.microsoft.com/office/drawing/2010/main" w="9525">
+                <a:solidFill>
+                  <a:schemeClr val="tx1"/>
+                </a:solidFill>
+                <a:miter lim="800000"/>
+                <a:headEnd/>
+                <a:tailEnd/>
+              </a14:hiddenLine>
+            </a:ext>
+          </a:extLst>
+        </p:spPr>
+      </p:pic>
+      <p:sp>
+        <p:nvSpPr>
+          <p:cNvPr id="59" name="テキスト ボックス 58"/>
+          <p:cNvSpPr txBox="1"/>
+          <p:nvPr/>
+        </p:nvSpPr>
+        <p:spPr>
+          <a:xfrm>
+            <a:off x="8753043" y="5651150"/>
+            <a:ext cx="5955426" cy="1107996"/>
+          </a:xfrm>
+          <a:prstGeom prst="rect">
+            <a:avLst/>
+          </a:prstGeom>
+          <a:noFill/>
+        </p:spPr>
+        <p:txBody>
+          <a:bodyPr wrap="square" rtlCol="0">
+            <a:spAutoFit/>
+          </a:bodyPr>
+          <a:lstStyle/>
+          <a:p>
+            <a:r>
+              <a:rPr lang="ja-JP" altLang="en-US" sz="1100" dirty="0" smtClean="0">
+                <a:solidFill>
+                  <a:srgbClr val="0000FF"/>
+                </a:solidFill>
+                <a:latin typeface="メイリオ" panose="020B0604030504040204" pitchFamily="50" charset="-128"/>
+                <a:ea typeface="メイリオ" panose="020B0604030504040204" pitchFamily="50" charset="-128"/>
+                <a:cs typeface="メイリオ" panose="020B0604030504040204" pitchFamily="50" charset="-128"/>
+              </a:rPr>
+              <a:t>動作</a:t>
+            </a:r>
+            <a:r>
+              <a:rPr lang="ja-JP" altLang="en-US" sz="1100" dirty="0" smtClean="0">
+                <a:latin typeface="メイリオ" panose="020B0604030504040204" pitchFamily="50" charset="-128"/>
+                <a:ea typeface="メイリオ" panose="020B0604030504040204" pitchFamily="50" charset="-128"/>
+                <a:cs typeface="メイリオ" panose="020B0604030504040204" pitchFamily="50" charset="-128"/>
+              </a:rPr>
+              <a:t>および</a:t>
+            </a:r>
+            <a:r>
+              <a:rPr lang="ja-JP" altLang="en-US" sz="1100" dirty="0" smtClean="0">
+                <a:solidFill>
+                  <a:srgbClr val="0000FF"/>
+                </a:solidFill>
+                <a:latin typeface="メイリオ" panose="020B0604030504040204" pitchFamily="50" charset="-128"/>
+                <a:ea typeface="メイリオ" panose="020B0604030504040204" pitchFamily="50" charset="-128"/>
+                <a:cs typeface="メイリオ" panose="020B0604030504040204" pitchFamily="50" charset="-128"/>
+              </a:rPr>
+              <a:t>センシング</a:t>
+            </a:r>
+            <a:r>
+              <a:rPr lang="ja-JP" altLang="en-US" sz="1100" dirty="0" smtClean="0">
+                <a:latin typeface="メイリオ" panose="020B0604030504040204" pitchFamily="50" charset="-128"/>
+                <a:ea typeface="メイリオ" panose="020B0604030504040204" pitchFamily="50" charset="-128"/>
+                <a:cs typeface="メイリオ" panose="020B0604030504040204" pitchFamily="50" charset="-128"/>
+              </a:rPr>
+              <a:t>は、</a:t>
+            </a:r>
+            <a:r>
+              <a:rPr lang="ja-JP" altLang="en-US" sz="1100" dirty="0">
+                <a:solidFill>
+                  <a:srgbClr val="0000FF"/>
+                </a:solidFill>
+                <a:latin typeface="メイリオ" panose="020B0604030504040204" pitchFamily="50" charset="-128"/>
+                <a:ea typeface="メイリオ" panose="020B0604030504040204" pitchFamily="50" charset="-128"/>
+                <a:cs typeface="メイリオ" panose="020B0604030504040204" pitchFamily="50" charset="-128"/>
+              </a:rPr>
+              <a:t>攻略手順</a:t>
+            </a:r>
+            <a:r>
+              <a:rPr lang="ja-JP" altLang="en-US" sz="1100" dirty="0" smtClean="0">
+                <a:solidFill>
+                  <a:srgbClr val="0000FF"/>
+                </a:solidFill>
+                <a:latin typeface="メイリオ" panose="020B0604030504040204" pitchFamily="50" charset="-128"/>
+                <a:ea typeface="メイリオ" panose="020B0604030504040204" pitchFamily="50" charset="-128"/>
+                <a:cs typeface="メイリオ" panose="020B0604030504040204" pitchFamily="50" charset="-128"/>
+              </a:rPr>
+              <a:t>実行</a:t>
+            </a:r>
+            <a:r>
+              <a:rPr lang="ja-JP" altLang="en-US" sz="1100" dirty="0" smtClean="0">
+                <a:latin typeface="メイリオ" panose="020B0604030504040204" pitchFamily="50" charset="-128"/>
+                <a:ea typeface="メイリオ" panose="020B0604030504040204" pitchFamily="50" charset="-128"/>
+                <a:cs typeface="メイリオ" panose="020B0604030504040204" pitchFamily="50" charset="-128"/>
+              </a:rPr>
+              <a:t>が必要</a:t>
+            </a:r>
+            <a:r>
+              <a:rPr lang="ja-JP" altLang="en-US" sz="1100" dirty="0">
+                <a:latin typeface="メイリオ" panose="020B0604030504040204" pitchFamily="50" charset="-128"/>
+                <a:ea typeface="メイリオ" panose="020B0604030504040204" pitchFamily="50" charset="-128"/>
+                <a:cs typeface="メイリオ" panose="020B0604030504040204" pitchFamily="50" charset="-128"/>
+              </a:rPr>
+              <a:t>とする</a:t>
+            </a:r>
+            <a:r>
+              <a:rPr lang="ja-JP" altLang="en-US" sz="1100" dirty="0" smtClean="0">
+                <a:latin typeface="メイリオ" panose="020B0604030504040204" pitchFamily="50" charset="-128"/>
+                <a:ea typeface="メイリオ" panose="020B0604030504040204" pitchFamily="50" charset="-128"/>
+                <a:cs typeface="メイリオ" panose="020B0604030504040204" pitchFamily="50" charset="-128"/>
+              </a:rPr>
+              <a:t>機能</a:t>
+            </a:r>
+            <a:r>
+              <a:rPr lang="en-US" altLang="ja-JP" sz="1100" dirty="0" smtClean="0">
+                <a:latin typeface="メイリオ" panose="020B0604030504040204" pitchFamily="50" charset="-128"/>
+                <a:ea typeface="メイリオ" panose="020B0604030504040204" pitchFamily="50" charset="-128"/>
+                <a:cs typeface="メイリオ" panose="020B0604030504040204" pitchFamily="50" charset="-128"/>
+              </a:rPr>
+              <a:t>(</a:t>
+            </a:r>
+            <a:r>
+              <a:rPr lang="en-US" altLang="ja-JP" sz="1100" b="1" dirty="0" smtClean="0">
+                <a:solidFill>
+                  <a:srgbClr val="D24726"/>
+                </a:solidFill>
+                <a:latin typeface="メイリオ" panose="020B0604030504040204" pitchFamily="50" charset="-128"/>
+                <a:ea typeface="メイリオ" panose="020B0604030504040204" pitchFamily="50" charset="-128"/>
+                <a:cs typeface="メイリオ" panose="020B0604030504040204" pitchFamily="50" charset="-128"/>
+              </a:rPr>
+              <a:t>3.</a:t>
+            </a:r>
+            <a:r>
+              <a:rPr lang="ja-JP" altLang="en-US" sz="1100" b="1" dirty="0" smtClean="0">
+                <a:solidFill>
+                  <a:srgbClr val="D24726"/>
+                </a:solidFill>
+                <a:latin typeface="メイリオ" panose="020B0604030504040204" pitchFamily="50" charset="-128"/>
+                <a:ea typeface="メイリオ" panose="020B0604030504040204" pitchFamily="50" charset="-128"/>
+                <a:cs typeface="メイリオ" panose="020B0604030504040204" pitchFamily="50" charset="-128"/>
+              </a:rPr>
+              <a:t>制御</a:t>
+            </a:r>
+            <a:r>
+              <a:rPr lang="en-US" altLang="ja-JP" sz="1100" dirty="0" smtClean="0">
+                <a:latin typeface="メイリオ" panose="020B0604030504040204" pitchFamily="50" charset="-128"/>
+                <a:ea typeface="メイリオ" panose="020B0604030504040204" pitchFamily="50" charset="-128"/>
+                <a:cs typeface="メイリオ" panose="020B0604030504040204" pitchFamily="50" charset="-128"/>
+              </a:rPr>
+              <a:t>)</a:t>
+            </a:r>
+            <a:r>
+              <a:rPr lang="ja-JP" altLang="en-US" sz="1100" dirty="0" err="1" smtClean="0">
+                <a:latin typeface="メイリオ" panose="020B0604030504040204" pitchFamily="50" charset="-128"/>
+                <a:ea typeface="メイリオ" panose="020B0604030504040204" pitchFamily="50" charset="-128"/>
+                <a:cs typeface="メイリオ" panose="020B0604030504040204" pitchFamily="50" charset="-128"/>
+              </a:rPr>
+              <a:t>を提</a:t>
+            </a:r>
+            <a:r>
+              <a:rPr lang="ja-JP" altLang="en-US" sz="1100" dirty="0" smtClean="0">
+                <a:latin typeface="メイリオ" panose="020B0604030504040204" pitchFamily="50" charset="-128"/>
+                <a:ea typeface="メイリオ" panose="020B0604030504040204" pitchFamily="50" charset="-128"/>
+                <a:cs typeface="メイリオ" panose="020B0604030504040204" pitchFamily="50" charset="-128"/>
+              </a:rPr>
+              <a:t>供する（例：ブロック色認識、自己位置推定等）。これらの機能は</a:t>
+            </a:r>
+            <a:r>
+              <a:rPr lang="en-US" altLang="ja-JP" sz="1100" dirty="0" smtClean="0">
+                <a:latin typeface="メイリオ" panose="020B0604030504040204" pitchFamily="50" charset="-128"/>
+                <a:ea typeface="メイリオ" panose="020B0604030504040204" pitchFamily="50" charset="-128"/>
+                <a:cs typeface="メイリオ" panose="020B0604030504040204" pitchFamily="50" charset="-128"/>
+              </a:rPr>
+              <a:t>EV3</a:t>
+            </a:r>
+            <a:r>
+              <a:rPr lang="ja-JP" altLang="en-US" sz="1100" dirty="0" smtClean="0">
+                <a:latin typeface="メイリオ" panose="020B0604030504040204" pitchFamily="50" charset="-128"/>
+                <a:ea typeface="メイリオ" panose="020B0604030504040204" pitchFamily="50" charset="-128"/>
+                <a:cs typeface="メイリオ" panose="020B0604030504040204" pitchFamily="50" charset="-128"/>
+              </a:rPr>
+              <a:t> </a:t>
+            </a:r>
+            <a:r>
+              <a:rPr lang="en-US" altLang="ja-JP" sz="1100" dirty="0" smtClean="0">
+                <a:latin typeface="メイリオ" panose="020B0604030504040204" pitchFamily="50" charset="-128"/>
+                <a:ea typeface="メイリオ" panose="020B0604030504040204" pitchFamily="50" charset="-128"/>
+                <a:cs typeface="メイリオ" panose="020B0604030504040204" pitchFamily="50" charset="-128"/>
+              </a:rPr>
+              <a:t>API</a:t>
+            </a:r>
+            <a:r>
+              <a:rPr lang="ja-JP" altLang="en-US" sz="1100" dirty="0" smtClean="0">
+                <a:latin typeface="メイリオ" panose="020B0604030504040204" pitchFamily="50" charset="-128"/>
+                <a:ea typeface="メイリオ" panose="020B0604030504040204" pitchFamily="50" charset="-128"/>
+                <a:cs typeface="メイリオ" panose="020B0604030504040204" pitchFamily="50" charset="-128"/>
+              </a:rPr>
+              <a:t>の簡易的なラッパーである</a:t>
+            </a:r>
+            <a:r>
+              <a:rPr lang="ja-JP" altLang="en-US" sz="1100" dirty="0">
+                <a:solidFill>
+                  <a:srgbClr val="0000FF"/>
+                </a:solidFill>
+                <a:latin typeface="メイリオ" panose="020B0604030504040204" pitchFamily="50" charset="-128"/>
+                <a:ea typeface="メイリオ" panose="020B0604030504040204" pitchFamily="50" charset="-128"/>
+                <a:cs typeface="メイリオ" panose="020B0604030504040204" pitchFamily="50" charset="-128"/>
+              </a:rPr>
+              <a:t>デバイス</a:t>
+            </a:r>
+            <a:r>
+              <a:rPr lang="ja-JP" altLang="en-US" sz="1100" dirty="0" smtClean="0">
+                <a:solidFill>
+                  <a:srgbClr val="0000FF"/>
+                </a:solidFill>
+                <a:latin typeface="メイリオ" panose="020B0604030504040204" pitchFamily="50" charset="-128"/>
+                <a:ea typeface="メイリオ" panose="020B0604030504040204" pitchFamily="50" charset="-128"/>
+                <a:cs typeface="メイリオ" panose="020B0604030504040204" pitchFamily="50" charset="-128"/>
+              </a:rPr>
+              <a:t>制御</a:t>
+            </a:r>
+            <a:r>
+              <a:rPr lang="ja-JP" altLang="en-US" sz="1100" dirty="0" smtClean="0">
+                <a:latin typeface="メイリオ" panose="020B0604030504040204" pitchFamily="50" charset="-128"/>
+                <a:ea typeface="メイリオ" panose="020B0604030504040204" pitchFamily="50" charset="-128"/>
+                <a:cs typeface="メイリオ" panose="020B0604030504040204" pitchFamily="50" charset="-128"/>
+              </a:rPr>
+              <a:t>を用いて実現される。</a:t>
+            </a:r>
+            <a:endParaRPr lang="en-US" altLang="ja-JP" sz="1100" dirty="0" smtClean="0">
+              <a:latin typeface="メイリオ" panose="020B0604030504040204" pitchFamily="50" charset="-128"/>
+              <a:ea typeface="メイリオ" panose="020B0604030504040204" pitchFamily="50" charset="-128"/>
+              <a:cs typeface="メイリオ" panose="020B0604030504040204" pitchFamily="50" charset="-128"/>
+            </a:endParaRPr>
+          </a:p>
+          <a:p>
+            <a:r>
+              <a:rPr lang="ja-JP" altLang="en-US" sz="1100" dirty="0" smtClean="0">
+                <a:latin typeface="メイリオ" panose="020B0604030504040204" pitchFamily="50" charset="-128"/>
+                <a:ea typeface="メイリオ" panose="020B0604030504040204" pitchFamily="50" charset="-128"/>
+                <a:cs typeface="メイリオ" panose="020B0604030504040204" pitchFamily="50" charset="-128"/>
+              </a:rPr>
+              <a:t>表示・</a:t>
+            </a:r>
+            <a:r>
+              <a:rPr lang="en-US" altLang="ja-JP" sz="1100" dirty="0" smtClean="0">
+                <a:latin typeface="メイリオ" panose="020B0604030504040204" pitchFamily="50" charset="-128"/>
+                <a:ea typeface="メイリオ" panose="020B0604030504040204" pitchFamily="50" charset="-128"/>
+                <a:cs typeface="メイリオ" panose="020B0604030504040204" pitchFamily="50" charset="-128"/>
+              </a:rPr>
+              <a:t>UI</a:t>
+            </a:r>
+            <a:r>
+              <a:rPr lang="ja-JP" altLang="en-US" sz="1100" dirty="0" smtClean="0">
+                <a:latin typeface="メイリオ" panose="020B0604030504040204" pitchFamily="50" charset="-128"/>
+                <a:ea typeface="メイリオ" panose="020B0604030504040204" pitchFamily="50" charset="-128"/>
+                <a:cs typeface="メイリオ" panose="020B0604030504040204" pitchFamily="50" charset="-128"/>
+              </a:rPr>
+              <a:t>は走行の開始時およびデバッグでのみ使用される</a:t>
+            </a:r>
+            <a:endParaRPr lang="en-US" altLang="ja-JP" sz="1100" dirty="0" smtClean="0">
+              <a:latin typeface="メイリオ" panose="020B0604030504040204" pitchFamily="50" charset="-128"/>
+              <a:ea typeface="メイリオ" panose="020B0604030504040204" pitchFamily="50" charset="-128"/>
+              <a:cs typeface="メイリオ" panose="020B0604030504040204" pitchFamily="50" charset="-128"/>
+            </a:endParaRPr>
+          </a:p>
+          <a:p>
+            <a:r>
+              <a:rPr lang="ja-JP" altLang="en-US" sz="1100" dirty="0" smtClean="0">
+                <a:latin typeface="メイリオ" panose="020B0604030504040204" pitchFamily="50" charset="-128"/>
+                <a:ea typeface="メイリオ" panose="020B0604030504040204" pitchFamily="50" charset="-128"/>
+                <a:cs typeface="メイリオ" panose="020B0604030504040204" pitchFamily="50" charset="-128"/>
+              </a:rPr>
+              <a:t>の機能で、他のパッケージからユーティリティ的に使用さ</a:t>
+            </a:r>
+            <a:endParaRPr lang="en-US" altLang="ja-JP" sz="1100" dirty="0" smtClean="0">
+              <a:latin typeface="メイリオ" panose="020B0604030504040204" pitchFamily="50" charset="-128"/>
+              <a:ea typeface="メイリオ" panose="020B0604030504040204" pitchFamily="50" charset="-128"/>
+              <a:cs typeface="メイリオ" panose="020B0604030504040204" pitchFamily="50" charset="-128"/>
+            </a:endParaRPr>
+          </a:p>
+          <a:p>
+            <a:r>
+              <a:rPr lang="ja-JP" altLang="en-US" sz="1100" dirty="0" smtClean="0">
+                <a:latin typeface="メイリオ" panose="020B0604030504040204" pitchFamily="50" charset="-128"/>
+                <a:ea typeface="メイリオ" panose="020B0604030504040204" pitchFamily="50" charset="-128"/>
+                <a:cs typeface="メイリオ" panose="020B0604030504040204" pitchFamily="50" charset="-128"/>
+              </a:rPr>
+              <a:t>れる。</a:t>
+            </a:r>
+            <a:endParaRPr lang="en-US" altLang="ja-JP" sz="1100" dirty="0" smtClean="0">
+              <a:latin typeface="メイリオ" panose="020B0604030504040204" pitchFamily="50" charset="-128"/>
+              <a:ea typeface="メイリオ" panose="020B0604030504040204" pitchFamily="50" charset="-128"/>
+              <a:cs typeface="メイリオ" panose="020B0604030504040204" pitchFamily="50" charset="-128"/>
+            </a:endParaRPr>
+          </a:p>
+        </p:txBody>
+      </p:sp>
+      <p:cxnSp>
+        <p:nvCxnSpPr>
+          <p:cNvPr id="64" name="直線矢印コネクタ 63"/>
+          <p:cNvCxnSpPr>
+            <a:stCxn id="3" idx="3"/>
+            <a:endCxn id="22" idx="1"/>
+          </p:cNvCxnSpPr>
+          <p:nvPr/>
+        </p:nvCxnSpPr>
+        <p:spPr>
+          <a:xfrm>
+            <a:off x="1558457" y="3633613"/>
+            <a:ext cx="247375" cy="482"/>
+          </a:xfrm>
+          <a:prstGeom prst="straightConnector1">
+            <a:avLst/>
+          </a:prstGeom>
+          <a:ln w="12700">
+            <a:solidFill>
+              <a:schemeClr val="tx1"/>
+            </a:solidFill>
+            <a:prstDash val="sysDash"/>
+            <a:tailEnd type="arrow" w="lg" len="med"/>
+          </a:ln>
+        </p:spPr>
+        <p:style>
+          <a:lnRef idx="1">
+            <a:schemeClr val="accent1"/>
+          </a:lnRef>
+          <a:fillRef idx="0">
+            <a:schemeClr val="accent1"/>
+          </a:fillRef>
+          <a:effectRef idx="0">
+            <a:schemeClr val="accent1"/>
+          </a:effectRef>
+          <a:fontRef idx="minor">
+            <a:schemeClr val="tx1"/>
+          </a:fontRef>
+        </p:style>
+      </p:cxnSp>
+      <p:pic>
+        <p:nvPicPr>
+          <p:cNvPr id="1030" name="Picture 6"/>
+          <p:cNvPicPr>
+            <a:picLocks noChangeAspect="1" noChangeArrowheads="1"/>
+          </p:cNvPicPr>
+          <p:nvPr/>
+        </p:nvPicPr>
+        <p:blipFill>
+          <a:blip r:embed="rId4" cstate="print">
+            <a:extLst>
+              <a:ext uri="{28A0092B-C50C-407E-A947-70E740481C1C}">
+                <a14:useLocalDpi xmlns:a14="http://schemas.microsoft.com/office/drawing/2010/main" val="0"/>
+              </a:ext>
+            </a:extLst>
+          </a:blip>
+          <a:srcRect/>
+          <a:stretch>
+            <a:fillRect/>
+          </a:stretch>
+        </p:blipFill>
+        <p:spPr bwMode="auto">
+          <a:xfrm>
+            <a:off x="390746" y="5415000"/>
+            <a:ext cx="8175958" cy="4978956"/>
+          </a:xfrm>
+          <a:prstGeom prst="rect">
+            <a:avLst/>
+          </a:prstGeom>
+          <a:noFill/>
+          <a:ln>
+            <a:noFill/>
+          </a:ln>
+          <a:extLst>
+            <a:ext uri="{909E8E84-426E-40DD-AFC4-6F175D3DCCD1}">
+              <a14:hiddenFill xmlns:a14="http://schemas.microsoft.com/office/drawing/2010/main">
+                <a:solidFill>
+                  <a:schemeClr val="accent1"/>
+                </a:solidFill>
+              </a14:hiddenFill>
+            </a:ext>
+            <a:ext uri="{91240B29-F687-4F45-9708-019B960494DF}">
+              <a14:hiddenLine xmlns:a14="http://schemas.microsoft.com/office/drawing/2010/main" w="9525">
+                <a:solidFill>
+                  <a:schemeClr val="tx1"/>
+                </a:solidFill>
+                <a:miter lim="800000"/>
+                <a:headEnd/>
+                <a:tailEnd/>
+              </a14:hiddenLine>
+            </a:ext>
+          </a:extLst>
         </p:spPr>
       </p:pic>
     </p:spTree>
@@ -7908,49 +8624,7 @@
                 <a:ea typeface="メイリオ" panose="020B0604030504040204" pitchFamily="50" charset="-128"/>
                 <a:cs typeface="メイリオ" panose="020B0604030504040204" pitchFamily="50" charset="-128"/>
               </a:rPr>
-              <a:t>(</a:t>
-            </a:r>
-            <a:r>
-              <a:rPr lang="ja-JP" altLang="en-US" sz="2000" dirty="0">
-                <a:ln w="0"/>
-                <a:solidFill>
-                  <a:schemeClr val="bg1">
-                    <a:lumMod val="50000"/>
-                  </a:schemeClr>
-                </a:solidFill>
-                <a:effectLst>
-                  <a:outerShdw blurRad="38100" dist="38100" dir="2700000" algn="tl">
-                    <a:srgbClr val="000000">
-                      <a:alpha val="43137"/>
-                    </a:srgbClr>
-                  </a:outerShdw>
-                </a:effectLst>
-                <a:latin typeface="メイリオ" panose="020B0604030504040204" pitchFamily="50" charset="-128"/>
-                <a:ea typeface="メイリオ" panose="020B0604030504040204" pitchFamily="50" charset="-128"/>
-                <a:cs typeface="メイリオ" panose="020B0604030504040204" pitchFamily="50" charset="-128"/>
-              </a:rPr>
-              <a:t>構造</a:t>
-            </a:r>
-            <a:r>
-              <a:rPr lang="en-US" altLang="ja-JP" sz="2000" dirty="0" smtClean="0">
-                <a:ln w="0"/>
-                <a:solidFill>
-                  <a:schemeClr val="bg1">
-                    <a:lumMod val="50000"/>
-                  </a:schemeClr>
-                </a:solidFill>
-                <a:effectLst>
-                  <a:outerShdw blurRad="38100" dist="38100" dir="2700000" algn="tl">
-                    <a:srgbClr val="000000">
-                      <a:alpha val="43137"/>
-                    </a:srgbClr>
-                  </a:outerShdw>
-                </a:effectLst>
-                <a:latin typeface="メイリオ" panose="020B0604030504040204" pitchFamily="50" charset="-128"/>
-                <a:ea typeface="メイリオ" panose="020B0604030504040204" pitchFamily="50" charset="-128"/>
-                <a:cs typeface="メイリオ" panose="020B0604030504040204" pitchFamily="50" charset="-128"/>
-              </a:rPr>
-              <a:t>)</a:t>
+              <a:t>(1)</a:t>
             </a:r>
             <a:endParaRPr lang="ja-JP" altLang="en-US" sz="2000" dirty="0">
               <a:ln w="0"/>
@@ -8217,31 +8891,7 @@
                 <a:ea typeface="メイリオ" panose="020B0604030504040204" pitchFamily="50" charset="-128"/>
                 <a:cs typeface="メイリオ" panose="020B0604030504040204" pitchFamily="50" charset="-128"/>
               </a:rPr>
-              <a:t>(</a:t>
-            </a:r>
-            <a:r>
-              <a:rPr lang="ja-JP" altLang="en-US" sz="2400" b="1" dirty="0" smtClean="0">
-                <a:ln w="0"/>
-                <a:solidFill>
-                  <a:schemeClr val="bg1"/>
-                </a:solidFill>
-                <a:latin typeface="メイリオ" panose="020B0604030504040204" pitchFamily="50" charset="-128"/>
-                <a:ea typeface="メイリオ" panose="020B0604030504040204" pitchFamily="50" charset="-128"/>
-                <a:cs typeface="メイリオ" panose="020B0604030504040204" pitchFamily="50" charset="-128"/>
-              </a:rPr>
-              <a:t>振舞</a:t>
-            </a:r>
-            <a:r>
-              <a:rPr lang="en-US" altLang="ja-JP" sz="2400" b="1" dirty="0" smtClean="0">
-                <a:ln w="0"/>
-                <a:solidFill>
-                  <a:schemeClr val="bg1"/>
-                </a:solidFill>
-                <a:latin typeface="メイリオ" panose="020B0604030504040204" pitchFamily="50" charset="-128"/>
-                <a:ea typeface="メイリオ" panose="020B0604030504040204" pitchFamily="50" charset="-128"/>
-                <a:cs typeface="メイリオ" panose="020B0604030504040204" pitchFamily="50" charset="-128"/>
-              </a:rPr>
-              <a:t>)</a:t>
+              <a:t>(2)</a:t>
             </a:r>
             <a:endParaRPr lang="ja-JP" altLang="en-US" sz="2400" b="1" dirty="0">
               <a:ln w="0"/>
@@ -8263,8 +8913,8 @@
         </p:nvSpPr>
         <p:spPr>
           <a:xfrm>
-            <a:off x="361022" y="991122"/>
-            <a:ext cx="11321474" cy="682239"/>
+            <a:off x="363226" y="991122"/>
+            <a:ext cx="11319270" cy="682239"/>
           </a:xfrm>
           <a:prstGeom prst="wedgeRectCallout">
             <a:avLst>
@@ -8307,15 +8957,497 @@
           <a:lstStyle/>
           <a:p>
             <a:pPr algn="ctr"/>
-            <a:r>
-              <a:rPr lang="ja-JP" altLang="en-US" sz="2716" dirty="0" smtClean="0">
-                <a:latin typeface="メイリオ" panose="020B0604030504040204" pitchFamily="50" charset="-128"/>
-                <a:ea typeface="メイリオ" panose="020B0604030504040204" pitchFamily="50" charset="-128"/>
-                <a:cs typeface="メイリオ" panose="020B0604030504040204" pitchFamily="50" charset="-128"/>
-              </a:rPr>
-              <a:t>ここに一文を入力</a:t>
-            </a:r>
             <a:endParaRPr lang="ja-JP" altLang="en-US" sz="2716" dirty="0">
+              <a:latin typeface="メイリオ" panose="020B0604030504040204" pitchFamily="50" charset="-128"/>
+              <a:ea typeface="メイリオ" panose="020B0604030504040204" pitchFamily="50" charset="-128"/>
+              <a:cs typeface="メイリオ" panose="020B0604030504040204" pitchFamily="50" charset="-128"/>
+            </a:endParaRPr>
+          </a:p>
+        </p:txBody>
+      </p:sp>
+      <p:sp>
+        <p:nvSpPr>
+          <p:cNvPr id="10" name="正方形/長方形 9"/>
+          <p:cNvSpPr/>
+          <p:nvPr/>
+        </p:nvSpPr>
+        <p:spPr>
+          <a:xfrm>
+            <a:off x="7225456" y="1944758"/>
+            <a:ext cx="7746138" cy="8345654"/>
+          </a:xfrm>
+          <a:prstGeom prst="rect">
+            <a:avLst/>
+          </a:prstGeom>
+          <a:noFill/>
+          <a:ln w="25400">
+            <a:solidFill>
+              <a:srgbClr val="D24726"/>
+            </a:solidFill>
+          </a:ln>
+        </p:spPr>
+        <p:style>
+          <a:lnRef idx="2">
+            <a:schemeClr val="accent1">
+              <a:shade val="50000"/>
+            </a:schemeClr>
+          </a:lnRef>
+          <a:fillRef idx="1">
+            <a:schemeClr val="accent1"/>
+          </a:fillRef>
+          <a:effectRef idx="0">
+            <a:schemeClr val="accent1"/>
+          </a:effectRef>
+          <a:fontRef idx="minor">
+            <a:schemeClr val="lt1"/>
+          </a:fontRef>
+        </p:style>
+        <p:txBody>
+          <a:bodyPr rtlCol="0" anchor="ctr"/>
+          <a:lstStyle/>
+          <a:p>
+            <a:pPr algn="ctr"/>
+            <a:endParaRPr kumimoji="1" lang="ja-JP" altLang="en-US"/>
+          </a:p>
+        </p:txBody>
+      </p:sp>
+      <p:sp>
+        <p:nvSpPr>
+          <p:cNvPr id="11" name="テキスト ボックス 10"/>
+          <p:cNvSpPr txBox="1"/>
+          <p:nvPr/>
+        </p:nvSpPr>
+        <p:spPr>
+          <a:xfrm>
+            <a:off x="7225456" y="1947572"/>
+            <a:ext cx="2948243" cy="307777"/>
+          </a:xfrm>
+          <a:prstGeom prst="rect">
+            <a:avLst/>
+          </a:prstGeom>
+          <a:solidFill>
+            <a:srgbClr val="D24726"/>
+          </a:solidFill>
+        </p:spPr>
+        <p:txBody>
+          <a:bodyPr wrap="none" rtlCol="0">
+            <a:spAutoFit/>
+          </a:bodyPr>
+          <a:lstStyle/>
+          <a:p>
+            <a:r>
+              <a:rPr lang="en-US" altLang="ja-JP" sz="1400" b="1" dirty="0" smtClean="0">
+                <a:solidFill>
+                  <a:schemeClr val="bg1"/>
+                </a:solidFill>
+                <a:latin typeface="メイリオ" panose="020B0604030504040204" pitchFamily="50" charset="-128"/>
+                <a:ea typeface="メイリオ" panose="020B0604030504040204" pitchFamily="50" charset="-128"/>
+                <a:cs typeface="メイリオ" panose="020B0604030504040204" pitchFamily="50" charset="-128"/>
+              </a:rPr>
+              <a:t>4</a:t>
+            </a:r>
+            <a:r>
+              <a:rPr kumimoji="1" lang="en-US" altLang="ja-JP" sz="1400" b="1" dirty="0" smtClean="0">
+                <a:solidFill>
+                  <a:schemeClr val="bg1"/>
+                </a:solidFill>
+                <a:latin typeface="メイリオ" panose="020B0604030504040204" pitchFamily="50" charset="-128"/>
+                <a:ea typeface="メイリオ" panose="020B0604030504040204" pitchFamily="50" charset="-128"/>
+                <a:cs typeface="メイリオ" panose="020B0604030504040204" pitchFamily="50" charset="-128"/>
+              </a:rPr>
+              <a:t>-2-2.</a:t>
+            </a:r>
+            <a:r>
+              <a:rPr lang="ja-JP" altLang="en-US" sz="1400" b="1" dirty="0" smtClean="0">
+                <a:solidFill>
+                  <a:schemeClr val="bg1"/>
+                </a:solidFill>
+                <a:latin typeface="メイリオ" panose="020B0604030504040204" pitchFamily="50" charset="-128"/>
+                <a:ea typeface="メイリオ" panose="020B0604030504040204" pitchFamily="50" charset="-128"/>
+                <a:cs typeface="メイリオ" panose="020B0604030504040204" pitchFamily="50" charset="-128"/>
+              </a:rPr>
+              <a:t> </a:t>
+            </a:r>
+            <a:r>
+              <a:rPr lang="en-US" altLang="ja-JP" sz="1400" b="1" dirty="0" smtClean="0">
+                <a:solidFill>
+                  <a:schemeClr val="bg1"/>
+                </a:solidFill>
+                <a:latin typeface="メイリオ" panose="020B0604030504040204" pitchFamily="50" charset="-128"/>
+                <a:ea typeface="メイリオ" panose="020B0604030504040204" pitchFamily="50" charset="-128"/>
+                <a:cs typeface="メイリオ" panose="020B0604030504040204" pitchFamily="50" charset="-128"/>
+              </a:rPr>
+              <a:t>R</a:t>
+            </a:r>
+            <a:r>
+              <a:rPr lang="ja-JP" altLang="en-US" sz="1400" b="1" dirty="0" smtClean="0">
+                <a:solidFill>
+                  <a:schemeClr val="bg1"/>
+                </a:solidFill>
+                <a:latin typeface="メイリオ" panose="020B0604030504040204" pitchFamily="50" charset="-128"/>
+                <a:ea typeface="メイリオ" panose="020B0604030504040204" pitchFamily="50" charset="-128"/>
+                <a:cs typeface="メイリオ" panose="020B0604030504040204" pitchFamily="50" charset="-128"/>
+              </a:rPr>
+              <a:t>ゲーム攻略のシーケンス</a:t>
+            </a:r>
+            <a:endParaRPr kumimoji="1" lang="ja-JP" altLang="en-US" sz="1400" b="1" dirty="0">
+              <a:solidFill>
+                <a:schemeClr val="bg1"/>
+              </a:solidFill>
+              <a:latin typeface="メイリオ" panose="020B0604030504040204" pitchFamily="50" charset="-128"/>
+              <a:ea typeface="メイリオ" panose="020B0604030504040204" pitchFamily="50" charset="-128"/>
+              <a:cs typeface="メイリオ" panose="020B0604030504040204" pitchFamily="50" charset="-128"/>
+            </a:endParaRPr>
+          </a:p>
+        </p:txBody>
+      </p:sp>
+      <p:pic>
+        <p:nvPicPr>
+          <p:cNvPr id="2050" name="Picture 2"/>
+          <p:cNvPicPr>
+            <a:picLocks noChangeAspect="1" noChangeArrowheads="1"/>
+          </p:cNvPicPr>
+          <p:nvPr/>
+        </p:nvPicPr>
+        <p:blipFill>
+          <a:blip r:embed="rId2" cstate="print">
+            <a:extLst>
+              <a:ext uri="{28A0092B-C50C-407E-A947-70E740481C1C}">
+                <a14:useLocalDpi xmlns:a14="http://schemas.microsoft.com/office/drawing/2010/main" val="0"/>
+              </a:ext>
+            </a:extLst>
+          </a:blip>
+          <a:srcRect/>
+          <a:stretch>
+            <a:fillRect/>
+          </a:stretch>
+        </p:blipFill>
+        <p:spPr bwMode="auto">
+          <a:xfrm>
+            <a:off x="-9740123" y="32072239"/>
+            <a:ext cx="8459472" cy="8259382"/>
+          </a:xfrm>
+          <a:prstGeom prst="rect">
+            <a:avLst/>
+          </a:prstGeom>
+          <a:noFill/>
+          <a:ln>
+            <a:noFill/>
+          </a:ln>
+          <a:extLst>
+            <a:ext uri="{909E8E84-426E-40DD-AFC4-6F175D3DCCD1}">
+              <a14:hiddenFill xmlns:a14="http://schemas.microsoft.com/office/drawing/2010/main">
+                <a:solidFill>
+                  <a:schemeClr val="accent1"/>
+                </a:solidFill>
+              </a14:hiddenFill>
+            </a:ext>
+            <a:ext uri="{91240B29-F687-4F45-9708-019B960494DF}">
+              <a14:hiddenLine xmlns:a14="http://schemas.microsoft.com/office/drawing/2010/main" w="9525">
+                <a:solidFill>
+                  <a:schemeClr val="tx1"/>
+                </a:solidFill>
+                <a:miter lim="800000"/>
+                <a:headEnd/>
+                <a:tailEnd/>
+              </a14:hiddenLine>
+            </a:ext>
+          </a:extLst>
+        </p:spPr>
+      </p:pic>
+      <p:pic>
+        <p:nvPicPr>
+          <p:cNvPr id="2051" name="Picture 3"/>
+          <p:cNvPicPr>
+            <a:picLocks noChangeAspect="1" noChangeArrowheads="1"/>
+          </p:cNvPicPr>
+          <p:nvPr/>
+        </p:nvPicPr>
+        <p:blipFill>
+          <a:blip r:embed="rId3" cstate="print">
+            <a:extLst>
+              <a:ext uri="{28A0092B-C50C-407E-A947-70E740481C1C}">
+                <a14:useLocalDpi xmlns:a14="http://schemas.microsoft.com/office/drawing/2010/main" val="0"/>
+              </a:ext>
+            </a:extLst>
+          </a:blip>
+          <a:srcRect/>
+          <a:stretch>
+            <a:fillRect/>
+          </a:stretch>
+        </p:blipFill>
+        <p:spPr bwMode="auto">
+          <a:xfrm>
+            <a:off x="7383725" y="2902142"/>
+            <a:ext cx="7427446" cy="7251791"/>
+          </a:xfrm>
+          <a:prstGeom prst="rect">
+            <a:avLst/>
+          </a:prstGeom>
+          <a:noFill/>
+          <a:ln>
+            <a:noFill/>
+          </a:ln>
+          <a:extLst>
+            <a:ext uri="{909E8E84-426E-40DD-AFC4-6F175D3DCCD1}">
+              <a14:hiddenFill xmlns:a14="http://schemas.microsoft.com/office/drawing/2010/main">
+                <a:solidFill>
+                  <a:schemeClr val="accent1"/>
+                </a:solidFill>
+              </a14:hiddenFill>
+            </a:ext>
+            <a:ext uri="{91240B29-F687-4F45-9708-019B960494DF}">
+              <a14:hiddenLine xmlns:a14="http://schemas.microsoft.com/office/drawing/2010/main" w="9525">
+                <a:solidFill>
+                  <a:schemeClr val="tx1"/>
+                </a:solidFill>
+                <a:miter lim="800000"/>
+                <a:headEnd/>
+                <a:tailEnd/>
+              </a14:hiddenLine>
+            </a:ext>
+          </a:extLst>
+        </p:spPr>
+      </p:pic>
+      <p:sp>
+        <p:nvSpPr>
+          <p:cNvPr id="18" name="正方形/長方形 17"/>
+          <p:cNvSpPr/>
+          <p:nvPr/>
+        </p:nvSpPr>
+        <p:spPr>
+          <a:xfrm>
+            <a:off x="363226" y="1947572"/>
+            <a:ext cx="6757330" cy="7138529"/>
+          </a:xfrm>
+          <a:prstGeom prst="rect">
+            <a:avLst/>
+          </a:prstGeom>
+          <a:noFill/>
+          <a:ln w="25400">
+            <a:solidFill>
+              <a:srgbClr val="D24726"/>
+            </a:solidFill>
+          </a:ln>
+        </p:spPr>
+        <p:style>
+          <a:lnRef idx="2">
+            <a:schemeClr val="accent1">
+              <a:shade val="50000"/>
+            </a:schemeClr>
+          </a:lnRef>
+          <a:fillRef idx="1">
+            <a:schemeClr val="accent1"/>
+          </a:fillRef>
+          <a:effectRef idx="0">
+            <a:schemeClr val="accent1"/>
+          </a:effectRef>
+          <a:fontRef idx="minor">
+            <a:schemeClr val="lt1"/>
+          </a:fontRef>
+        </p:style>
+        <p:txBody>
+          <a:bodyPr rtlCol="0" anchor="ctr"/>
+          <a:lstStyle/>
+          <a:p>
+            <a:pPr algn="ctr"/>
+            <a:endParaRPr kumimoji="1" lang="ja-JP" altLang="en-US"/>
+          </a:p>
+        </p:txBody>
+      </p:sp>
+      <p:sp>
+        <p:nvSpPr>
+          <p:cNvPr id="19" name="テキスト ボックス 18"/>
+          <p:cNvSpPr txBox="1"/>
+          <p:nvPr/>
+        </p:nvSpPr>
+        <p:spPr>
+          <a:xfrm>
+            <a:off x="363226" y="1947572"/>
+            <a:ext cx="3352200" cy="307777"/>
+          </a:xfrm>
+          <a:prstGeom prst="rect">
+            <a:avLst/>
+          </a:prstGeom>
+          <a:solidFill>
+            <a:srgbClr val="D24726"/>
+          </a:solidFill>
+        </p:spPr>
+        <p:txBody>
+          <a:bodyPr wrap="none" rtlCol="0">
+            <a:spAutoFit/>
+          </a:bodyPr>
+          <a:lstStyle/>
+          <a:p>
+            <a:r>
+              <a:rPr lang="en-US" altLang="ja-JP" sz="1400" b="1" dirty="0" smtClean="0">
+                <a:solidFill>
+                  <a:schemeClr val="bg1"/>
+                </a:solidFill>
+                <a:latin typeface="メイリオ" panose="020B0604030504040204" pitchFamily="50" charset="-128"/>
+                <a:ea typeface="メイリオ" panose="020B0604030504040204" pitchFamily="50" charset="-128"/>
+                <a:cs typeface="メイリオ" panose="020B0604030504040204" pitchFamily="50" charset="-128"/>
+              </a:rPr>
+              <a:t>4</a:t>
+            </a:r>
+            <a:r>
+              <a:rPr kumimoji="1" lang="en-US" altLang="ja-JP" sz="1400" b="1" dirty="0" smtClean="0">
+                <a:solidFill>
+                  <a:schemeClr val="bg1"/>
+                </a:solidFill>
+                <a:latin typeface="メイリオ" panose="020B0604030504040204" pitchFamily="50" charset="-128"/>
+                <a:ea typeface="メイリオ" panose="020B0604030504040204" pitchFamily="50" charset="-128"/>
+                <a:cs typeface="メイリオ" panose="020B0604030504040204" pitchFamily="50" charset="-128"/>
+              </a:rPr>
+              <a:t>-2-1.</a:t>
+            </a:r>
+            <a:r>
+              <a:rPr lang="ja-JP" altLang="en-US" sz="1400" b="1" dirty="0" smtClean="0">
+                <a:solidFill>
+                  <a:schemeClr val="bg1"/>
+                </a:solidFill>
+                <a:latin typeface="メイリオ" panose="020B0604030504040204" pitchFamily="50" charset="-128"/>
+                <a:ea typeface="メイリオ" panose="020B0604030504040204" pitchFamily="50" charset="-128"/>
+                <a:cs typeface="メイリオ" panose="020B0604030504040204" pitchFamily="50" charset="-128"/>
+              </a:rPr>
+              <a:t> 経路探索時の探索子の振る舞い</a:t>
+            </a:r>
+            <a:endParaRPr kumimoji="1" lang="ja-JP" altLang="en-US" sz="1400" b="1" dirty="0">
+              <a:solidFill>
+                <a:schemeClr val="bg1"/>
+              </a:solidFill>
+              <a:latin typeface="メイリオ" panose="020B0604030504040204" pitchFamily="50" charset="-128"/>
+              <a:ea typeface="メイリオ" panose="020B0604030504040204" pitchFamily="50" charset="-128"/>
+              <a:cs typeface="メイリオ" panose="020B0604030504040204" pitchFamily="50" charset="-128"/>
+            </a:endParaRPr>
+          </a:p>
+        </p:txBody>
+      </p:sp>
+      <p:sp>
+        <p:nvSpPr>
+          <p:cNvPr id="22" name="テキスト ボックス 21"/>
+          <p:cNvSpPr txBox="1"/>
+          <p:nvPr/>
+        </p:nvSpPr>
+        <p:spPr>
+          <a:xfrm>
+            <a:off x="7377856" y="2459032"/>
+            <a:ext cx="7224929" cy="430887"/>
+          </a:xfrm>
+          <a:prstGeom prst="rect">
+            <a:avLst/>
+          </a:prstGeom>
+          <a:noFill/>
+        </p:spPr>
+        <p:txBody>
+          <a:bodyPr wrap="square" rtlCol="0">
+            <a:spAutoFit/>
+          </a:bodyPr>
+          <a:lstStyle/>
+          <a:p>
+            <a:r>
+              <a:rPr lang="en-US" altLang="ja-JP" sz="1100" dirty="0" smtClean="0">
+                <a:latin typeface="メイリオ" panose="020B0604030504040204" pitchFamily="50" charset="-128"/>
+                <a:ea typeface="メイリオ" panose="020B0604030504040204" pitchFamily="50" charset="-128"/>
+                <a:cs typeface="メイリオ" panose="020B0604030504040204" pitchFamily="50" charset="-128"/>
+              </a:rPr>
+              <a:t>R</a:t>
+            </a:r>
+            <a:r>
+              <a:rPr lang="ja-JP" altLang="en-US" sz="1100" dirty="0" smtClean="0">
+                <a:latin typeface="メイリオ" panose="020B0604030504040204" pitchFamily="50" charset="-128"/>
+                <a:ea typeface="メイリオ" panose="020B0604030504040204" pitchFamily="50" charset="-128"/>
+                <a:cs typeface="メイリオ" panose="020B0604030504040204" pitchFamily="50" charset="-128"/>
+              </a:rPr>
+              <a:t>ゲームの攻略をシーケンスを、</a:t>
+            </a:r>
+            <a:r>
+              <a:rPr lang="ja-JP" altLang="en-US" sz="1100" dirty="0">
+                <a:latin typeface="メイリオ" panose="020B0604030504040204" pitchFamily="50" charset="-128"/>
+                <a:ea typeface="メイリオ" panose="020B0604030504040204" pitchFamily="50" charset="-128"/>
+                <a:cs typeface="メイリオ" panose="020B0604030504040204" pitchFamily="50" charset="-128"/>
+              </a:rPr>
+              <a:t>攻略手順</a:t>
+            </a:r>
+            <a:r>
+              <a:rPr lang="ja-JP" altLang="en-US" sz="1100" dirty="0" smtClean="0">
+                <a:latin typeface="メイリオ" panose="020B0604030504040204" pitchFamily="50" charset="-128"/>
+                <a:ea typeface="メイリオ" panose="020B0604030504040204" pitchFamily="50" charset="-128"/>
+                <a:cs typeface="メイリオ" panose="020B0604030504040204" pitchFamily="50" charset="-128"/>
+              </a:rPr>
+              <a:t>の作成と実行に注目して例示する（</a:t>
+            </a:r>
+            <a:r>
+              <a:rPr lang="ja-JP" altLang="en-US" sz="1100" dirty="0">
+                <a:latin typeface="メイリオ" panose="020B0604030504040204" pitchFamily="50" charset="-128"/>
+                <a:ea typeface="メイリオ" panose="020B0604030504040204" pitchFamily="50" charset="-128"/>
+                <a:cs typeface="メイリオ" panose="020B0604030504040204" pitchFamily="50" charset="-128"/>
+              </a:rPr>
+              <a:t>各</a:t>
+            </a:r>
+            <a:r>
+              <a:rPr lang="ja-JP" altLang="en-US" sz="1100" dirty="0" smtClean="0">
+                <a:latin typeface="メイリオ" panose="020B0604030504040204" pitchFamily="50" charset="-128"/>
+                <a:ea typeface="メイリオ" panose="020B0604030504040204" pitchFamily="50" charset="-128"/>
+                <a:cs typeface="メイリオ" panose="020B0604030504040204" pitchFamily="50" charset="-128"/>
+              </a:rPr>
+              <a:t>パッケージのルートは既に作成済み）。</a:t>
+            </a:r>
+            <a:endParaRPr lang="en-US" altLang="ja-JP" sz="1100" dirty="0" smtClean="0">
+              <a:latin typeface="メイリオ" panose="020B0604030504040204" pitchFamily="50" charset="-128"/>
+              <a:ea typeface="メイリオ" panose="020B0604030504040204" pitchFamily="50" charset="-128"/>
+              <a:cs typeface="メイリオ" panose="020B0604030504040204" pitchFamily="50" charset="-128"/>
+            </a:endParaRPr>
+          </a:p>
+        </p:txBody>
+      </p:sp>
+      <p:sp>
+        <p:nvSpPr>
+          <p:cNvPr id="23" name="テキスト ボックス 22"/>
+          <p:cNvSpPr txBox="1"/>
+          <p:nvPr/>
+        </p:nvSpPr>
+        <p:spPr>
+          <a:xfrm>
+            <a:off x="425618" y="2328227"/>
+            <a:ext cx="6632545" cy="261610"/>
+          </a:xfrm>
+          <a:prstGeom prst="rect">
+            <a:avLst/>
+          </a:prstGeom>
+          <a:noFill/>
+        </p:spPr>
+        <p:txBody>
+          <a:bodyPr wrap="square" rtlCol="0">
+            <a:spAutoFit/>
+          </a:bodyPr>
+          <a:lstStyle/>
+          <a:p>
+            <a:r>
+              <a:rPr lang="ja-JP" altLang="en-US" sz="1100" dirty="0" smtClean="0">
+                <a:latin typeface="メイリオ" panose="020B0604030504040204" pitchFamily="50" charset="-128"/>
+                <a:ea typeface="メイリオ" panose="020B0604030504040204" pitchFamily="50" charset="-128"/>
+                <a:cs typeface="メイリオ" panose="020B0604030504040204" pitchFamily="50" charset="-128"/>
+              </a:rPr>
+              <a:t>分析</a:t>
+            </a:r>
+            <a:r>
+              <a:rPr lang="en-US" altLang="ja-JP" sz="1100" dirty="0" smtClean="0">
+                <a:latin typeface="メイリオ" panose="020B0604030504040204" pitchFamily="50" charset="-128"/>
+                <a:ea typeface="メイリオ" panose="020B0604030504040204" pitchFamily="50" charset="-128"/>
+                <a:cs typeface="メイリオ" panose="020B0604030504040204" pitchFamily="50" charset="-128"/>
+              </a:rPr>
+              <a:t>2-3.</a:t>
+            </a:r>
+            <a:r>
+              <a:rPr lang="ja-JP" altLang="en-US" sz="1100" dirty="0" smtClean="0">
+                <a:latin typeface="メイリオ" panose="020B0604030504040204" pitchFamily="50" charset="-128"/>
+                <a:ea typeface="メイリオ" panose="020B0604030504040204" pitchFamily="50" charset="-128"/>
+                <a:cs typeface="メイリオ" panose="020B0604030504040204" pitchFamily="50" charset="-128"/>
+              </a:rPr>
+              <a:t>で検討した抽象マップ上を移動し、目的地への経路を探索する探索子の振る舞いを記述する。</a:t>
+            </a:r>
+            <a:endParaRPr lang="en-US" altLang="ja-JP" sz="1100" dirty="0" smtClean="0">
               <a:latin typeface="メイリオ" panose="020B0604030504040204" pitchFamily="50" charset="-128"/>
               <a:ea typeface="メイリオ" panose="020B0604030504040204" pitchFamily="50" charset="-128"/>
               <a:cs typeface="メイリオ" panose="020B0604030504040204" pitchFamily="50" charset="-128"/>
@@ -8598,7 +9730,7 @@
   <a:extraClrSchemeLst/>
   <a:extLst>
     <a:ext uri="{05A4C25C-085E-4340-85A3-A5531E510DB2}">
-      <thm15:themeFamily xmlns:thm15="http://schemas.microsoft.com/office/thememl/2012/main" name="Office Theme" id="{62F939B6-93AF-4DB8-9C6B-D6C7DFDC589F}" vid="{4A3C46E8-61CC-4603-A589-7422A47A8E4A}"/>
+      <thm15:themeFamily xmlns:thm15="http://schemas.microsoft.com/office/thememl/2012/main" xmlns="" name="Office Theme" id="{62F939B6-93AF-4DB8-9C6B-D6C7DFDC589F}" vid="{4A3C46E8-61CC-4603-A589-7422A47A8E4A}"/>
     </a:ext>
   </a:extLst>
 </a:theme>
@@ -8859,7 +9991,7 @@
   <a:extraClrSchemeLst/>
   <a:extLst>
     <a:ext uri="{05A4C25C-085E-4340-85A3-A5531E510DB2}">
-      <thm15:themeFamily xmlns:thm15="http://schemas.microsoft.com/office/thememl/2012/main" name="Office Theme" id="{62F939B6-93AF-4DB8-9C6B-D6C7DFDC589F}" vid="{4A3C46E8-61CC-4603-A589-7422A47A8E4A}"/>
+      <thm15:themeFamily xmlns:thm15="http://schemas.microsoft.com/office/thememl/2012/main" xmlns="" name="Office Theme" id="{62F939B6-93AF-4DB8-9C6B-D6C7DFDC589F}" vid="{4A3C46E8-61CC-4603-A589-7422A47A8E4A}"/>
     </a:ext>
   </a:extLst>
 </a:theme>

</xml_diff>

<commit_message>
PPTX and Astah file uploaded.
</commit_message>
<xml_diff>
--- a/design/2016/models/4_design_model.pptx
+++ b/design/2016/models/4_design_model.pptx
@@ -110,7 +110,7 @@
   </p:defaultTextStyle>
   <p:extLst>
     <p:ext uri="{EFAFB233-063F-42B5-8137-9DF3F51BA10A}">
-      <p15:sldGuideLst xmlns:p15="http://schemas.microsoft.com/office/powerpoint/2012/main" xmlns=""/>
+      <p15:sldGuideLst xmlns="" xmlns:p15="http://schemas.microsoft.com/office/powerpoint/2012/main"/>
     </p:ext>
   </p:extLst>
 </p:presentation>
@@ -7165,6 +7165,9 @@
             </a:r>
             <a:r>
               <a:rPr kumimoji="1" lang="en-US" altLang="ja-JP" sz="1100" dirty="0" smtClean="0">
+                <a:solidFill>
+                  <a:srgbClr val="0000FF"/>
+                </a:solidFill>
                 <a:latin typeface="メイリオ" panose="020B0604030504040204" pitchFamily="50" charset="-128"/>
                 <a:ea typeface="メイリオ" panose="020B0604030504040204" pitchFamily="50" charset="-128"/>
                 <a:cs typeface="メイリオ" panose="020B0604030504040204" pitchFamily="50" charset="-128"/>
@@ -7173,11 +7176,41 @@
             </a:r>
             <a:r>
               <a:rPr kumimoji="1" lang="ja-JP" altLang="en-US" sz="1100" dirty="0" smtClean="0">
-                <a:latin typeface="メイリオ" panose="020B0604030504040204" pitchFamily="50" charset="-128"/>
-                <a:ea typeface="メイリオ" panose="020B0604030504040204" pitchFamily="50" charset="-128"/>
-                <a:cs typeface="メイリオ" panose="020B0604030504040204" pitchFamily="50" charset="-128"/>
-              </a:rPr>
-              <a:t>ゲーム攻略、走行エリア攻略、表示・</a:t>
+                <a:solidFill>
+                  <a:srgbClr val="0000FF"/>
+                </a:solidFill>
+                <a:latin typeface="メイリオ" panose="020B0604030504040204" pitchFamily="50" charset="-128"/>
+                <a:ea typeface="メイリオ" panose="020B0604030504040204" pitchFamily="50" charset="-128"/>
+                <a:cs typeface="メイリオ" panose="020B0604030504040204" pitchFamily="50" charset="-128"/>
+              </a:rPr>
+              <a:t>ゲーム攻略</a:t>
+            </a:r>
+            <a:r>
+              <a:rPr kumimoji="1" lang="ja-JP" altLang="en-US" sz="1100" dirty="0" smtClean="0">
+                <a:latin typeface="メイリオ" panose="020B0604030504040204" pitchFamily="50" charset="-128"/>
+                <a:ea typeface="メイリオ" panose="020B0604030504040204" pitchFamily="50" charset="-128"/>
+                <a:cs typeface="メイリオ" panose="020B0604030504040204" pitchFamily="50" charset="-128"/>
+              </a:rPr>
+              <a:t>、</a:t>
+            </a:r>
+            <a:r>
+              <a:rPr kumimoji="1" lang="ja-JP" altLang="en-US" sz="1100" dirty="0" smtClean="0">
+                <a:solidFill>
+                  <a:srgbClr val="0000FF"/>
+                </a:solidFill>
+                <a:latin typeface="メイリオ" panose="020B0604030504040204" pitchFamily="50" charset="-128"/>
+                <a:ea typeface="メイリオ" panose="020B0604030504040204" pitchFamily="50" charset="-128"/>
+                <a:cs typeface="メイリオ" panose="020B0604030504040204" pitchFamily="50" charset="-128"/>
+              </a:rPr>
+              <a:t>走行エリア攻略</a:t>
+            </a:r>
+            <a:r>
+              <a:rPr kumimoji="1" lang="ja-JP" altLang="en-US" sz="1100" dirty="0" smtClean="0">
+                <a:latin typeface="メイリオ" panose="020B0604030504040204" pitchFamily="50" charset="-128"/>
+                <a:ea typeface="メイリオ" panose="020B0604030504040204" pitchFamily="50" charset="-128"/>
+                <a:cs typeface="メイリオ" panose="020B0604030504040204" pitchFamily="50" charset="-128"/>
+              </a:rPr>
+              <a:t>、表示・</a:t>
             </a:r>
             <a:r>
               <a:rPr kumimoji="1" lang="en-US" altLang="ja-JP" sz="1100" dirty="0" smtClean="0">
@@ -7217,7 +7250,15 @@
                 <a:ea typeface="メイリオ" panose="020B0604030504040204" pitchFamily="50" charset="-128"/>
                 <a:cs typeface="メイリオ" panose="020B0604030504040204" pitchFamily="50" charset="-128"/>
               </a:rPr>
-              <a:t>または走行エリア攻略を実行する。</a:t>
+              <a:t>または走行エリア</a:t>
+            </a:r>
+            <a:r>
+              <a:rPr lang="ja-JP" altLang="en-US" sz="1100" dirty="0" smtClean="0">
+                <a:latin typeface="メイリオ" panose="020B0604030504040204" pitchFamily="50" charset="-128"/>
+                <a:ea typeface="メイリオ" panose="020B0604030504040204" pitchFamily="50" charset="-128"/>
+                <a:cs typeface="メイリオ" panose="020B0604030504040204" pitchFamily="50" charset="-128"/>
+              </a:rPr>
+              <a:t>攻略および攻略手順実行パッケージのルートの実行関数が呼び出される。</a:t>
             </a:r>
             <a:endParaRPr kumimoji="1" lang="ja-JP" altLang="en-US" sz="1100" dirty="0">
               <a:latin typeface="メイリオ" panose="020B0604030504040204" pitchFamily="50" charset="-128"/>
@@ -7350,18 +7391,7 @@
                 <a:ea typeface="メイリオ" panose="020B0604030504040204" pitchFamily="50" charset="-128"/>
                 <a:cs typeface="メイリオ" panose="020B0604030504040204" pitchFamily="50" charset="-128"/>
               </a:rPr>
-              <a:t>ゲーム</a:t>
-            </a:r>
-            <a:r>
-              <a:rPr lang="ja-JP" altLang="en-US" sz="1400" b="1" dirty="0" smtClean="0">
-                <a:solidFill>
-                  <a:schemeClr val="bg1"/>
-                </a:solidFill>
-                <a:latin typeface="メイリオ" panose="020B0604030504040204" pitchFamily="50" charset="-128"/>
-                <a:ea typeface="メイリオ" panose="020B0604030504040204" pitchFamily="50" charset="-128"/>
-                <a:cs typeface="メイリオ" panose="020B0604030504040204" pitchFamily="50" charset="-128"/>
-              </a:rPr>
-              <a:t>攻略</a:t>
+              <a:t>ゲーム攻略</a:t>
             </a:r>
             <a:r>
               <a:rPr lang="ja-JP" altLang="en-US" sz="1400" b="1" dirty="0">
@@ -7396,30 +7426,6 @@
           </a:p>
         </p:txBody>
       </p:sp>
-      <p:pic>
-        <p:nvPicPr>
-          <p:cNvPr id="79" name="図 78"/>
-          <p:cNvPicPr>
-            <a:picLocks noChangeAspect="1"/>
-          </p:cNvPicPr>
-          <p:nvPr/>
-        </p:nvPicPr>
-        <p:blipFill>
-          <a:blip r:embed="rId2"/>
-          <a:stretch>
-            <a:fillRect/>
-          </a:stretch>
-        </p:blipFill>
-        <p:spPr>
-          <a:xfrm>
-            <a:off x="8753043" y="2689390"/>
-            <a:ext cx="5955426" cy="2361075"/>
-          </a:xfrm>
-          <a:prstGeom prst="rect">
-            <a:avLst/>
-          </a:prstGeom>
-        </p:spPr>
-      </p:pic>
       <p:sp>
         <p:nvSpPr>
           <p:cNvPr id="55" name="テキスト ボックス 54"/>
@@ -7739,7 +7745,7 @@
           <p:nvPr/>
         </p:nvPicPr>
         <p:blipFill>
-          <a:blip r:embed="rId3" cstate="print">
+          <a:blip r:embed="rId2" cstate="print">
             <a:extLst>
               <a:ext uri="{28A0092B-C50C-407E-A947-70E740481C1C}">
                 <a14:useLocalDpi xmlns:a14="http://schemas.microsoft.com/office/drawing/2010/main" val="0"/>
@@ -8015,6 +8021,9 @@
           <a:p>
             <a:r>
               <a:rPr lang="ja-JP" altLang="en-US" sz="1100" dirty="0" smtClean="0">
+                <a:solidFill>
+                  <a:srgbClr val="0000FF"/>
+                </a:solidFill>
                 <a:latin typeface="メイリオ" panose="020B0604030504040204" pitchFamily="50" charset="-128"/>
                 <a:ea typeface="メイリオ" panose="020B0604030504040204" pitchFamily="50" charset="-128"/>
                 <a:cs typeface="メイリオ" panose="020B0604030504040204" pitchFamily="50" charset="-128"/>
@@ -8023,6 +8032,9 @@
             </a:r>
             <a:r>
               <a:rPr lang="en-US" altLang="ja-JP" sz="1100" dirty="0" smtClean="0">
+                <a:solidFill>
+                  <a:srgbClr val="0000FF"/>
+                </a:solidFill>
                 <a:latin typeface="メイリオ" panose="020B0604030504040204" pitchFamily="50" charset="-128"/>
                 <a:ea typeface="メイリオ" panose="020B0604030504040204" pitchFamily="50" charset="-128"/>
                 <a:cs typeface="メイリオ" panose="020B0604030504040204" pitchFamily="50" charset="-128"/>
@@ -8117,7 +8129,61 @@
       </p:cxnSp>
       <p:pic>
         <p:nvPicPr>
-          <p:cNvPr id="1030" name="Picture 6"/>
+          <p:cNvPr id="1027" name="Picture 3"/>
+          <p:cNvPicPr>
+            <a:picLocks noChangeAspect="1" noChangeArrowheads="1"/>
+          </p:cNvPicPr>
+          <p:nvPr/>
+        </p:nvPicPr>
+        <p:blipFill>
+          <a:blip r:embed="rId3" cstate="print">
+            <a:extLst>
+              <a:ext uri="{28A0092B-C50C-407E-A947-70E740481C1C}">
+                <a14:useLocalDpi xmlns:a14="http://schemas.microsoft.com/office/drawing/2010/main" val="0"/>
+              </a:ext>
+            </a:extLst>
+          </a:blip>
+          <a:srcRect/>
+          <a:stretch>
+            <a:fillRect/>
+          </a:stretch>
+        </p:blipFill>
+        <p:spPr bwMode="auto">
+          <a:xfrm>
+            <a:off x="8879208" y="2680184"/>
+            <a:ext cx="5710087" cy="2427907"/>
+          </a:xfrm>
+          <a:prstGeom prst="rect">
+            <a:avLst/>
+          </a:prstGeom>
+          <a:noFill/>
+          <a:ln>
+            <a:noFill/>
+          </a:ln>
+          <a:extLst>
+            <a:ext uri="{909E8E84-426E-40DD-AFC4-6F175D3DCCD1}">
+              <a14:hiddenFill xmlns:a14="http://schemas.microsoft.com/office/drawing/2010/main">
+                <a:solidFill>
+                  <a:schemeClr val="accent1"/>
+                </a:solidFill>
+              </a14:hiddenFill>
+            </a:ext>
+            <a:ext uri="{91240B29-F687-4F45-9708-019B960494DF}">
+              <a14:hiddenLine xmlns:a14="http://schemas.microsoft.com/office/drawing/2010/main" w="9525">
+                <a:solidFill>
+                  <a:schemeClr val="tx1"/>
+                </a:solidFill>
+                <a:miter lim="800000"/>
+                <a:headEnd/>
+                <a:tailEnd/>
+              </a14:hiddenLine>
+            </a:ext>
+          </a:extLst>
+        </p:spPr>
+      </p:pic>
+      <p:pic>
+        <p:nvPicPr>
+          <p:cNvPr id="1028" name="Picture 4"/>
           <p:cNvPicPr>
             <a:picLocks noChangeAspect="1" noChangeArrowheads="1"/>
           </p:cNvPicPr>
@@ -8138,8 +8204,8 @@
         </p:blipFill>
         <p:spPr bwMode="auto">
           <a:xfrm>
-            <a:off x="390746" y="5415000"/>
-            <a:ext cx="8175958" cy="4978956"/>
+            <a:off x="414438" y="5486407"/>
+            <a:ext cx="8153671" cy="4934538"/>
           </a:xfrm>
           <a:prstGeom prst="rect">
             <a:avLst/>
@@ -8957,6 +9023,22 @@
           <a:lstStyle/>
           <a:p>
             <a:pPr algn="ctr"/>
+            <a:r>
+              <a:rPr lang="ja-JP" altLang="en-US" sz="2716" dirty="0">
+                <a:latin typeface="メイリオ" panose="020B0604030504040204" pitchFamily="50" charset="-128"/>
+                <a:ea typeface="メイリオ" panose="020B0604030504040204" pitchFamily="50" charset="-128"/>
+                <a:cs typeface="メイリオ" panose="020B0604030504040204" pitchFamily="50" charset="-128"/>
+              </a:rPr>
+              <a:t>システム</a:t>
+            </a:r>
+            <a:r>
+              <a:rPr lang="ja-JP" altLang="en-US" sz="2716" dirty="0" smtClean="0">
+                <a:latin typeface="メイリオ" panose="020B0604030504040204" pitchFamily="50" charset="-128"/>
+                <a:ea typeface="メイリオ" panose="020B0604030504040204" pitchFamily="50" charset="-128"/>
+                <a:cs typeface="メイリオ" panose="020B0604030504040204" pitchFamily="50" charset="-128"/>
+              </a:rPr>
+              <a:t>は各パッケージのメイン関数の呼び出しで実行される</a:t>
+            </a:r>
             <a:endParaRPr lang="ja-JP" altLang="en-US" sz="2716" dirty="0">
               <a:latin typeface="メイリオ" panose="020B0604030504040204" pitchFamily="50" charset="-128"/>
               <a:ea typeface="メイリオ" panose="020B0604030504040204" pitchFamily="50" charset="-128"/>
@@ -8973,8 +9055,8 @@
         </p:nvSpPr>
         <p:spPr>
           <a:xfrm>
-            <a:off x="7225456" y="1944758"/>
-            <a:ext cx="7746138" cy="8345654"/>
+            <a:off x="7968136" y="1947572"/>
+            <a:ext cx="7003458" cy="8257477"/>
           </a:xfrm>
           <a:prstGeom prst="rect">
             <a:avLst/>
@@ -9019,7 +9101,7 @@
         </p:nvSpPr>
         <p:spPr>
           <a:xfrm>
-            <a:off x="7225456" y="1947572"/>
+            <a:off x="7968136" y="1942761"/>
             <a:ext cx="2948243" cy="307777"/>
           </a:xfrm>
           <a:prstGeom prst="rect">
@@ -9155,60 +9237,6 @@
           </a:extLst>
         </p:spPr>
       </p:pic>
-      <p:pic>
-        <p:nvPicPr>
-          <p:cNvPr id="2051" name="Picture 3"/>
-          <p:cNvPicPr>
-            <a:picLocks noChangeAspect="1" noChangeArrowheads="1"/>
-          </p:cNvPicPr>
-          <p:nvPr/>
-        </p:nvPicPr>
-        <p:blipFill>
-          <a:blip r:embed="rId3" cstate="print">
-            <a:extLst>
-              <a:ext uri="{28A0092B-C50C-407E-A947-70E740481C1C}">
-                <a14:useLocalDpi xmlns:a14="http://schemas.microsoft.com/office/drawing/2010/main" val="0"/>
-              </a:ext>
-            </a:extLst>
-          </a:blip>
-          <a:srcRect/>
-          <a:stretch>
-            <a:fillRect/>
-          </a:stretch>
-        </p:blipFill>
-        <p:spPr bwMode="auto">
-          <a:xfrm>
-            <a:off x="7383725" y="2902142"/>
-            <a:ext cx="7427446" cy="7251791"/>
-          </a:xfrm>
-          <a:prstGeom prst="rect">
-            <a:avLst/>
-          </a:prstGeom>
-          <a:noFill/>
-          <a:ln>
-            <a:noFill/>
-          </a:ln>
-          <a:extLst>
-            <a:ext uri="{909E8E84-426E-40DD-AFC4-6F175D3DCCD1}">
-              <a14:hiddenFill xmlns:a14="http://schemas.microsoft.com/office/drawing/2010/main">
-                <a:solidFill>
-                  <a:schemeClr val="accent1"/>
-                </a:solidFill>
-              </a14:hiddenFill>
-            </a:ext>
-            <a:ext uri="{91240B29-F687-4F45-9708-019B960494DF}">
-              <a14:hiddenLine xmlns:a14="http://schemas.microsoft.com/office/drawing/2010/main" w="9525">
-                <a:solidFill>
-                  <a:schemeClr val="tx1"/>
-                </a:solidFill>
-                <a:miter lim="800000"/>
-                <a:headEnd/>
-                <a:tailEnd/>
-              </a14:hiddenLine>
-            </a:ext>
-          </a:extLst>
-        </p:spPr>
-      </p:pic>
       <p:sp>
         <p:nvSpPr>
           <p:cNvPr id="18" name="正方形/長方形 17"/>
@@ -9218,7 +9246,7 @@
         <p:spPr>
           <a:xfrm>
             <a:off x="363226" y="1947572"/>
-            <a:ext cx="6757330" cy="7138529"/>
+            <a:ext cx="7478185" cy="8257477"/>
           </a:xfrm>
           <a:prstGeom prst="rect">
             <a:avLst/>
@@ -9264,7 +9292,7 @@
         <p:spPr>
           <a:xfrm>
             <a:off x="363226" y="1947572"/>
-            <a:ext cx="3352200" cy="307777"/>
+            <a:ext cx="2993127" cy="307777"/>
           </a:xfrm>
           <a:prstGeom prst="rect">
             <a:avLst/>
@@ -9310,7 +9338,29 @@
                 <a:ea typeface="メイリオ" panose="020B0604030504040204" pitchFamily="50" charset="-128"/>
                 <a:cs typeface="メイリオ" panose="020B0604030504040204" pitchFamily="50" charset="-128"/>
               </a:rPr>
-              <a:t> 経路探索時の探索子の振る舞い</a:t>
+              <a:t> </a:t>
+            </a:r>
+            <a:r>
+              <a:rPr lang="ja-JP" altLang="en-US" sz="1400" b="1" dirty="0" smtClean="0">
+                <a:solidFill>
+                  <a:schemeClr val="bg1"/>
+                </a:solidFill>
+                <a:latin typeface="メイリオ" panose="020B0604030504040204" pitchFamily="50" charset="-128"/>
+                <a:ea typeface="メイリオ" panose="020B0604030504040204" pitchFamily="50" charset="-128"/>
+                <a:cs typeface="メイリオ" panose="020B0604030504040204" pitchFamily="50" charset="-128"/>
+              </a:rPr>
+              <a:t>システム</a:t>
+            </a:r>
+            <a:r>
+              <a:rPr lang="ja-JP" altLang="en-US" sz="1400" b="1" dirty="0" smtClean="0">
+                <a:solidFill>
+                  <a:schemeClr val="bg1"/>
+                </a:solidFill>
+                <a:latin typeface="メイリオ" panose="020B0604030504040204" pitchFamily="50" charset="-128"/>
+                <a:ea typeface="メイリオ" panose="020B0604030504040204" pitchFamily="50" charset="-128"/>
+                <a:cs typeface="メイリオ" panose="020B0604030504040204" pitchFamily="50" charset="-128"/>
+              </a:rPr>
+              <a:t>全体のシーケンス</a:t>
             </a:r>
             <a:endParaRPr kumimoji="1" lang="ja-JP" altLang="en-US" sz="1400" b="1" dirty="0">
               <a:solidFill>
@@ -9331,8 +9381,8 @@
         </p:nvSpPr>
         <p:spPr>
           <a:xfrm>
-            <a:off x="7377856" y="2459032"/>
-            <a:ext cx="7224929" cy="430887"/>
+            <a:off x="8283630" y="2459031"/>
+            <a:ext cx="6562430" cy="430887"/>
           </a:xfrm>
           <a:prstGeom prst="rect">
             <a:avLst/>
@@ -9410,7 +9460,7 @@
         <p:spPr>
           <a:xfrm>
             <a:off x="425618" y="2328227"/>
-            <a:ext cx="6632545" cy="261610"/>
+            <a:ext cx="7258072" cy="600164"/>
           </a:xfrm>
           <a:prstGeom prst="rect">
             <a:avLst/>
@@ -9429,23 +9479,116 @@
                 <a:ea typeface="メイリオ" panose="020B0604030504040204" pitchFamily="50" charset="-128"/>
                 <a:cs typeface="メイリオ" panose="020B0604030504040204" pitchFamily="50" charset="-128"/>
               </a:rPr>
-              <a:t>分析</a:t>
+              <a:t>プログラム開始時に、</a:t>
+            </a:r>
+            <a:r>
+              <a:rPr lang="en-US" altLang="ja-JP" sz="1100" b="1" dirty="0" smtClean="0">
+                <a:solidFill>
+                  <a:srgbClr val="D24726"/>
+                </a:solidFill>
+                <a:latin typeface="メイリオ" panose="020B0604030504040204" pitchFamily="50" charset="-128"/>
+                <a:ea typeface="メイリオ" panose="020B0604030504040204" pitchFamily="50" charset="-128"/>
+                <a:cs typeface="メイリオ" panose="020B0604030504040204" pitchFamily="50" charset="-128"/>
+              </a:rPr>
+              <a:t>4.1</a:t>
+            </a:r>
+            <a:r>
+              <a:rPr lang="ja-JP" altLang="en-US" sz="1100" dirty="0" smtClean="0">
+                <a:latin typeface="メイリオ" panose="020B0604030504040204" pitchFamily="50" charset="-128"/>
+                <a:ea typeface="メイリオ" panose="020B0604030504040204" pitchFamily="50" charset="-128"/>
+                <a:cs typeface="メイリオ" panose="020B0604030504040204" pitchFamily="50" charset="-128"/>
+              </a:rPr>
+              <a:t> で示した階層の下から上の順に全パッケージのルートが作成される。全パッケージのルートを作成後、全体制御のメインループで、</a:t>
             </a:r>
             <a:r>
               <a:rPr lang="en-US" altLang="ja-JP" sz="1100" dirty="0" smtClean="0">
-                <a:latin typeface="メイリオ" panose="020B0604030504040204" pitchFamily="50" charset="-128"/>
-                <a:ea typeface="メイリオ" panose="020B0604030504040204" pitchFamily="50" charset="-128"/>
-                <a:cs typeface="メイリオ" panose="020B0604030504040204" pitchFamily="50" charset="-128"/>
-              </a:rPr>
-              <a:t>2-3.</a:t>
+                <a:solidFill>
+                  <a:srgbClr val="0000FF"/>
+                </a:solidFill>
+                <a:latin typeface="メイリオ" panose="020B0604030504040204" pitchFamily="50" charset="-128"/>
+                <a:ea typeface="メイリオ" panose="020B0604030504040204" pitchFamily="50" charset="-128"/>
+                <a:cs typeface="メイリオ" panose="020B0604030504040204" pitchFamily="50" charset="-128"/>
+              </a:rPr>
+              <a:t>R</a:t>
             </a:r>
             <a:r>
               <a:rPr lang="ja-JP" altLang="en-US" sz="1100" dirty="0" smtClean="0">
-                <a:latin typeface="メイリオ" panose="020B0604030504040204" pitchFamily="50" charset="-128"/>
-                <a:ea typeface="メイリオ" panose="020B0604030504040204" pitchFamily="50" charset="-128"/>
-                <a:cs typeface="メイリオ" panose="020B0604030504040204" pitchFamily="50" charset="-128"/>
-              </a:rPr>
-              <a:t>で検討した抽象マップ上を移動し、目的地への経路を探索する探索子の振る舞いを記述する。</a:t>
+                <a:solidFill>
+                  <a:srgbClr val="0000FF"/>
+                </a:solidFill>
+                <a:latin typeface="メイリオ" panose="020B0604030504040204" pitchFamily="50" charset="-128"/>
+                <a:ea typeface="メイリオ" panose="020B0604030504040204" pitchFamily="50" charset="-128"/>
+                <a:cs typeface="メイリオ" panose="020B0604030504040204" pitchFamily="50" charset="-128"/>
+              </a:rPr>
+              <a:t>ゲーム攻略ルート</a:t>
+            </a:r>
+            <a:r>
+              <a:rPr lang="ja-JP" altLang="en-US" sz="1100" dirty="0" smtClean="0">
+                <a:latin typeface="メイリオ" panose="020B0604030504040204" pitchFamily="50" charset="-128"/>
+                <a:ea typeface="メイリオ" panose="020B0604030504040204" pitchFamily="50" charset="-128"/>
+                <a:cs typeface="メイリオ" panose="020B0604030504040204" pitchFamily="50" charset="-128"/>
+              </a:rPr>
+              <a:t>、</a:t>
+            </a:r>
+            <a:r>
+              <a:rPr lang="ja-JP" altLang="en-US" sz="1100" dirty="0" smtClean="0">
+                <a:solidFill>
+                  <a:srgbClr val="0000FF"/>
+                </a:solidFill>
+                <a:latin typeface="メイリオ" panose="020B0604030504040204" pitchFamily="50" charset="-128"/>
+                <a:ea typeface="メイリオ" panose="020B0604030504040204" pitchFamily="50" charset="-128"/>
+                <a:cs typeface="メイリオ" panose="020B0604030504040204" pitchFamily="50" charset="-128"/>
+              </a:rPr>
+              <a:t>走行エリア攻略</a:t>
+            </a:r>
+            <a:r>
+              <a:rPr lang="ja-JP" altLang="en-US" sz="1100" dirty="0">
+                <a:solidFill>
+                  <a:srgbClr val="0000FF"/>
+                </a:solidFill>
+                <a:latin typeface="メイリオ" panose="020B0604030504040204" pitchFamily="50" charset="-128"/>
+                <a:ea typeface="メイリオ" panose="020B0604030504040204" pitchFamily="50" charset="-128"/>
+                <a:cs typeface="メイリオ" panose="020B0604030504040204" pitchFamily="50" charset="-128"/>
+              </a:rPr>
+              <a:t>ルート</a:t>
+            </a:r>
+            <a:r>
+              <a:rPr lang="ja-JP" altLang="en-US" sz="1100" dirty="0" smtClean="0">
+                <a:latin typeface="メイリオ" panose="020B0604030504040204" pitchFamily="50" charset="-128"/>
+                <a:ea typeface="メイリオ" panose="020B0604030504040204" pitchFamily="50" charset="-128"/>
+                <a:cs typeface="メイリオ" panose="020B0604030504040204" pitchFamily="50" charset="-128"/>
+              </a:rPr>
+              <a:t>、</a:t>
+            </a:r>
+            <a:r>
+              <a:rPr lang="ja-JP" altLang="en-US" sz="1100" dirty="0" smtClean="0">
+                <a:solidFill>
+                  <a:srgbClr val="0000FF"/>
+                </a:solidFill>
+                <a:latin typeface="メイリオ" panose="020B0604030504040204" pitchFamily="50" charset="-128"/>
+                <a:ea typeface="メイリオ" panose="020B0604030504040204" pitchFamily="50" charset="-128"/>
+                <a:cs typeface="メイリオ" panose="020B0604030504040204" pitchFamily="50" charset="-128"/>
+              </a:rPr>
+              <a:t>攻略手順実行</a:t>
+            </a:r>
+            <a:r>
+              <a:rPr lang="ja-JP" altLang="en-US" sz="1100" dirty="0">
+                <a:solidFill>
+                  <a:srgbClr val="0000FF"/>
+                </a:solidFill>
+                <a:latin typeface="メイリオ" panose="020B0604030504040204" pitchFamily="50" charset="-128"/>
+                <a:ea typeface="メイリオ" panose="020B0604030504040204" pitchFamily="50" charset="-128"/>
+                <a:cs typeface="メイリオ" panose="020B0604030504040204" pitchFamily="50" charset="-128"/>
+              </a:rPr>
+              <a:t>ルート</a:t>
+            </a:r>
+            <a:r>
+              <a:rPr lang="ja-JP" altLang="en-US" sz="1100" dirty="0" smtClean="0">
+                <a:latin typeface="メイリオ" panose="020B0604030504040204" pitchFamily="50" charset="-128"/>
+                <a:ea typeface="メイリオ" panose="020B0604030504040204" pitchFamily="50" charset="-128"/>
+                <a:cs typeface="メイリオ" panose="020B0604030504040204" pitchFamily="50" charset="-128"/>
+              </a:rPr>
+              <a:t>の実行関数が呼びだされる。</a:t>
             </a:r>
             <a:endParaRPr lang="en-US" altLang="ja-JP" sz="1100" dirty="0" smtClean="0">
               <a:latin typeface="メイリオ" panose="020B0604030504040204" pitchFamily="50" charset="-128"/>
@@ -9455,6 +9598,114 @@
           </a:p>
         </p:txBody>
       </p:sp>
+      <p:pic>
+        <p:nvPicPr>
+          <p:cNvPr id="2" name="Picture 2"/>
+          <p:cNvPicPr>
+            <a:picLocks noChangeAspect="1" noChangeArrowheads="1"/>
+          </p:cNvPicPr>
+          <p:nvPr/>
+        </p:nvPicPr>
+        <p:blipFill>
+          <a:blip r:embed="rId3" cstate="print">
+            <a:extLst>
+              <a:ext uri="{28A0092B-C50C-407E-A947-70E740481C1C}">
+                <a14:useLocalDpi xmlns:a14="http://schemas.microsoft.com/office/drawing/2010/main" val="0"/>
+              </a:ext>
+            </a:extLst>
+          </a:blip>
+          <a:srcRect/>
+          <a:stretch>
+            <a:fillRect/>
+          </a:stretch>
+        </p:blipFill>
+        <p:spPr bwMode="auto">
+          <a:xfrm>
+            <a:off x="533332" y="3369328"/>
+            <a:ext cx="7255033" cy="5973080"/>
+          </a:xfrm>
+          <a:prstGeom prst="rect">
+            <a:avLst/>
+          </a:prstGeom>
+          <a:noFill/>
+          <a:ln>
+            <a:noFill/>
+          </a:ln>
+          <a:extLst>
+            <a:ext uri="{909E8E84-426E-40DD-AFC4-6F175D3DCCD1}">
+              <a14:hiddenFill xmlns:a14="http://schemas.microsoft.com/office/drawing/2010/main">
+                <a:solidFill>
+                  <a:schemeClr val="accent1"/>
+                </a:solidFill>
+              </a14:hiddenFill>
+            </a:ext>
+            <a:ext uri="{91240B29-F687-4F45-9708-019B960494DF}">
+              <a14:hiddenLine xmlns:a14="http://schemas.microsoft.com/office/drawing/2010/main" w="9525">
+                <a:solidFill>
+                  <a:schemeClr val="tx1"/>
+                </a:solidFill>
+                <a:miter lim="800000"/>
+                <a:headEnd/>
+                <a:tailEnd/>
+              </a14:hiddenLine>
+            </a:ext>
+          </a:extLst>
+        </p:spPr>
+      </p:pic>
+      <p:pic>
+        <p:nvPicPr>
+          <p:cNvPr id="3" name="Picture 3"/>
+          <p:cNvPicPr>
+            <a:picLocks noChangeAspect="1" noChangeArrowheads="1"/>
+          </p:cNvPicPr>
+          <p:nvPr/>
+        </p:nvPicPr>
+        <p:blipFill>
+          <a:blip r:embed="rId4" cstate="print">
+            <a:extLst>
+              <a:ext uri="{28A0092B-C50C-407E-A947-70E740481C1C}">
+                <a14:useLocalDpi xmlns:a14="http://schemas.microsoft.com/office/drawing/2010/main" val="0"/>
+              </a:ext>
+            </a:extLst>
+          </a:blip>
+          <a:srcRect/>
+          <a:stretch>
+            <a:fillRect/>
+          </a:stretch>
+        </p:blipFill>
+        <p:spPr bwMode="auto">
+          <a:xfrm>
+            <a:off x="8093775" y="2928391"/>
+            <a:ext cx="6823225" cy="6676509"/>
+          </a:xfrm>
+          <a:prstGeom prst="rect">
+            <a:avLst/>
+          </a:prstGeom>
+          <a:noFill/>
+          <a:ln>
+            <a:noFill/>
+          </a:ln>
+          <a:extLst>
+            <a:ext uri="{909E8E84-426E-40DD-AFC4-6F175D3DCCD1}">
+              <a14:hiddenFill xmlns:a14="http://schemas.microsoft.com/office/drawing/2010/main">
+                <a:solidFill>
+                  <a:schemeClr val="accent1"/>
+                </a:solidFill>
+              </a14:hiddenFill>
+            </a:ext>
+            <a:ext uri="{91240B29-F687-4F45-9708-019B960494DF}">
+              <a14:hiddenLine xmlns:a14="http://schemas.microsoft.com/office/drawing/2010/main" w="9525">
+                <a:solidFill>
+                  <a:schemeClr val="tx1"/>
+                </a:solidFill>
+                <a:miter lim="800000"/>
+                <a:headEnd/>
+                <a:tailEnd/>
+              </a14:hiddenLine>
+            </a:ext>
+          </a:extLst>
+        </p:spPr>
+      </p:pic>
     </p:spTree>
     <p:extLst>
       <p:ext uri="{BB962C8B-B14F-4D97-AF65-F5344CB8AC3E}">
@@ -9730,7 +9981,7 @@
   <a:extraClrSchemeLst/>
   <a:extLst>
     <a:ext uri="{05A4C25C-085E-4340-85A3-A5531E510DB2}">
-      <thm15:themeFamily xmlns:thm15="http://schemas.microsoft.com/office/thememl/2012/main" xmlns="" name="Office Theme" id="{62F939B6-93AF-4DB8-9C6B-D6C7DFDC589F}" vid="{4A3C46E8-61CC-4603-A589-7422A47A8E4A}"/>
+      <thm15:themeFamily xmlns="" xmlns:thm15="http://schemas.microsoft.com/office/thememl/2012/main" name="Office Theme" id="{62F939B6-93AF-4DB8-9C6B-D6C7DFDC589F}" vid="{4A3C46E8-61CC-4603-A589-7422A47A8E4A}"/>
     </a:ext>
   </a:extLst>
 </a:theme>
@@ -9991,7 +10242,7 @@
   <a:extraClrSchemeLst/>
   <a:extLst>
     <a:ext uri="{05A4C25C-085E-4340-85A3-A5531E510DB2}">
-      <thm15:themeFamily xmlns:thm15="http://schemas.microsoft.com/office/thememl/2012/main" xmlns="" name="Office Theme" id="{62F939B6-93AF-4DB8-9C6B-D6C7DFDC589F}" vid="{4A3C46E8-61CC-4603-A589-7422A47A8E4A}"/>
+      <thm15:themeFamily xmlns="" xmlns:thm15="http://schemas.microsoft.com/office/thememl/2012/main" name="Office Theme" id="{62F939B6-93AF-4DB8-9C6B-D6C7DFDC589F}" vid="{4A3C46E8-61CC-4603-A589-7422A47A8E4A}"/>
     </a:ext>
   </a:extLst>
 </a:theme>

</xml_diff>